<commit_message>
- TOF timer 구현 1차 완료
</commit_message>
<xml_diff>
--- a/DsDotNet/src/Engine/Engine.Core/Timer.pptx
+++ b/DsDotNet/src/Engine/Engine.Core/Timer.pptx
@@ -10,7 +10,8 @@
     <p:sldId id="261" r:id="rId4"/>
     <p:sldId id="257" r:id="rId5"/>
     <p:sldId id="258" r:id="rId6"/>
-    <p:sldId id="259" r:id="rId7"/>
+    <p:sldId id="262" r:id="rId7"/>
+    <p:sldId id="259" r:id="rId8"/>
   </p:sldIdLst>
   <p:sldSz cx="12192000" cy="6858000"/>
   <p:notesSz cx="6858000" cy="9144000"/>
@@ -3504,14 +3505,38 @@
           <a:p>
             <a:pPr lvl="1"/>
             <a:r>
-              <a:rPr lang="en-US" altLang="ko-KR" dirty="0">
+              <a:rPr lang="en-US" altLang="ko-KR" b="1" dirty="0">
                 <a:hlinkClick r:id="rId4"/>
               </a:rPr>
               <a:t>https://edisciplinas.usp.br/pluginfile.php/184942/mod_resource/content/1/Logix5000%20-%20Manual%20de%20Referencias.pdf</a:t>
             </a:r>
             <a:r>
+              <a:rPr lang="en-US" altLang="ko-KR" b="1" dirty="0"/>
+              <a:t>   </a:t>
+            </a:r>
+          </a:p>
+          <a:p>
+            <a:r>
               <a:rPr lang="en-US" altLang="ko-KR" dirty="0"/>
-              <a:t>   </a:t>
+              <a:t>LS </a:t>
+            </a:r>
+            <a:r>
+              <a:rPr lang="ko-KR" altLang="en-US" dirty="0"/>
+              <a:t>산전</a:t>
+            </a:r>
+            <a:endParaRPr lang="en-US" altLang="ko-KR" dirty="0"/>
+          </a:p>
+          <a:p>
+            <a:pPr lvl="1"/>
+            <a:r>
+              <a:rPr lang="en-US" altLang="ko-KR" dirty="0">
+                <a:hlinkClick r:id="rId5"/>
+              </a:rPr>
+              <a:t>http://www.famart.co.kr/resource/ls/%EC%82%AC%EC%9A%A9%EC%84%A4%EB%AA%85%EC%84%9C_XGK_XGB_%EB%AA%85%EB%A0%B9%EC%96%B4%EC%A7%91_%EA%B5%AD%EB%AC%B8_V2.3.pdf</a:t>
+            </a:r>
+            <a:r>
+              <a:rPr lang="en-US" altLang="ko-KR" dirty="0"/>
+              <a:t> </a:t>
             </a:r>
             <a:endParaRPr lang="ko-KR" altLang="en-US" dirty="0"/>
           </a:p>
@@ -3927,6 +3952,242 @@
           </a:prstGeom>
         </p:spPr>
       </p:pic>
+      <p:sp>
+        <p:nvSpPr>
+          <p:cNvPr id="5" name="TextBox 4">
+            <a:extLst>
+              <a:ext uri="{FF2B5EF4-FFF2-40B4-BE49-F238E27FC236}">
+                <a16:creationId xmlns:a16="http://schemas.microsoft.com/office/drawing/2014/main" id="{E6390EA6-4D77-AD12-FDF3-A7BA880D4898}"/>
+              </a:ext>
+            </a:extLst>
+          </p:cNvPr>
+          <p:cNvSpPr txBox="1"/>
+          <p:nvPr/>
+        </p:nvSpPr>
+        <p:spPr>
+          <a:xfrm>
+            <a:off x="738909" y="5698836"/>
+            <a:ext cx="7638245" cy="369332"/>
+          </a:xfrm>
+          <a:prstGeom prst="rect">
+            <a:avLst/>
+          </a:prstGeom>
+          <a:noFill/>
+        </p:spPr>
+        <p:txBody>
+          <a:bodyPr wrap="none" rtlCol="0">
+            <a:spAutoFit/>
+          </a:bodyPr>
+          <a:lstStyle/>
+          <a:p>
+            <a:r>
+              <a:rPr lang="ko-KR" altLang="en-US" dirty="0"/>
+              <a:t>동영상 </a:t>
+            </a:r>
+            <a:r>
+              <a:rPr lang="en-US" altLang="ko-KR" dirty="0">
+                <a:hlinkClick r:id="rId3"/>
+              </a:rPr>
+              <a:t>https://www.youtube.com/watch?v=KdRpvMTskUI&amp;t=351s</a:t>
+            </a:r>
+            <a:r>
+              <a:rPr lang="en-US" altLang="ko-KR" dirty="0"/>
+              <a:t>  5:25</a:t>
+            </a:r>
+            <a:endParaRPr lang="ko-KR" altLang="en-US" dirty="0"/>
+          </a:p>
+        </p:txBody>
+      </p:sp>
+      <p:sp>
+        <p:nvSpPr>
+          <p:cNvPr id="6" name="TextBox 5">
+            <a:extLst>
+              <a:ext uri="{FF2B5EF4-FFF2-40B4-BE49-F238E27FC236}">
+                <a16:creationId xmlns:a16="http://schemas.microsoft.com/office/drawing/2014/main" id="{2ECC0942-F069-3B68-EE20-A565266315D2}"/>
+              </a:ext>
+            </a:extLst>
+          </p:cNvPr>
+          <p:cNvSpPr txBox="1"/>
+          <p:nvPr/>
+        </p:nvSpPr>
+        <p:spPr>
+          <a:xfrm>
+            <a:off x="406400" y="2041236"/>
+            <a:ext cx="2231701" cy="246221"/>
+          </a:xfrm>
+          <a:prstGeom prst="rect">
+            <a:avLst/>
+          </a:prstGeom>
+          <a:noFill/>
+        </p:spPr>
+        <p:txBody>
+          <a:bodyPr wrap="none" rtlCol="0">
+            <a:spAutoFit/>
+          </a:bodyPr>
+          <a:lstStyle/>
+          <a:p>
+            <a:r>
+              <a:rPr lang="en-US" altLang="ko-KR" sz="1000" dirty="0"/>
+              <a:t>EN</a:t>
+            </a:r>
+            <a:r>
+              <a:rPr lang="ko-KR" altLang="en-US" sz="1000" dirty="0"/>
+              <a:t> 는 </a:t>
+            </a:r>
+            <a:r>
+              <a:rPr lang="en-US" altLang="ko-KR" sz="1000" dirty="0"/>
+              <a:t>Rung-condition-in </a:t>
+            </a:r>
+            <a:r>
+              <a:rPr lang="ko-KR" altLang="en-US" sz="1000" dirty="0"/>
+              <a:t>을 </a:t>
+            </a:r>
+            <a:r>
+              <a:rPr lang="ko-KR" altLang="en-US" sz="1000" dirty="0" err="1"/>
+              <a:t>따라감</a:t>
+            </a:r>
+            <a:endParaRPr lang="ko-KR" altLang="en-US" sz="1000" dirty="0"/>
+          </a:p>
+        </p:txBody>
+      </p:sp>
+      <p:sp>
+        <p:nvSpPr>
+          <p:cNvPr id="7" name="TextBox 6">
+            <a:extLst>
+              <a:ext uri="{FF2B5EF4-FFF2-40B4-BE49-F238E27FC236}">
+                <a16:creationId xmlns:a16="http://schemas.microsoft.com/office/drawing/2014/main" id="{E9EFA226-9482-2576-12DB-C1C827D4EB16}"/>
+              </a:ext>
+            </a:extLst>
+          </p:cNvPr>
+          <p:cNvSpPr txBox="1"/>
+          <p:nvPr/>
+        </p:nvSpPr>
+        <p:spPr>
+          <a:xfrm>
+            <a:off x="406399" y="2625147"/>
+            <a:ext cx="2294218" cy="400110"/>
+          </a:xfrm>
+          <a:prstGeom prst="rect">
+            <a:avLst/>
+          </a:prstGeom>
+          <a:noFill/>
+        </p:spPr>
+        <p:txBody>
+          <a:bodyPr wrap="none" rtlCol="0">
+            <a:spAutoFit/>
+          </a:bodyPr>
+          <a:lstStyle/>
+          <a:p>
+            <a:r>
+              <a:rPr lang="en-US" altLang="ko-KR" sz="1000" dirty="0"/>
+              <a:t>TT</a:t>
+            </a:r>
+            <a:r>
+              <a:rPr lang="ko-KR" altLang="en-US" sz="1000" dirty="0"/>
+              <a:t> 는 </a:t>
+            </a:r>
+            <a:r>
+              <a:rPr lang="en-US" altLang="ko-KR" sz="1000" dirty="0"/>
+              <a:t>timing measure </a:t>
+            </a:r>
+            <a:r>
+              <a:rPr lang="ko-KR" altLang="en-US" sz="1000" dirty="0"/>
+              <a:t>중에만 </a:t>
+            </a:r>
+            <a:r>
+              <a:rPr lang="en-US" altLang="ko-KR" sz="1000" dirty="0"/>
+              <a:t>ON </a:t>
+            </a:r>
+            <a:r>
+              <a:rPr lang="ko-KR" altLang="en-US" sz="1000" dirty="0"/>
+              <a:t>됨</a:t>
+            </a:r>
+            <a:endParaRPr lang="en-US" altLang="ko-KR" sz="1000" dirty="0"/>
+          </a:p>
+          <a:p>
+            <a:r>
+              <a:rPr lang="en-US" altLang="ko-KR" sz="1000" dirty="0"/>
+              <a:t>! EN &amp;&amp; DN</a:t>
+            </a:r>
+            <a:endParaRPr lang="ko-KR" altLang="en-US" sz="1000" dirty="0"/>
+          </a:p>
+        </p:txBody>
+      </p:sp>
+      <p:sp>
+        <p:nvSpPr>
+          <p:cNvPr id="8" name="TextBox 7">
+            <a:extLst>
+              <a:ext uri="{FF2B5EF4-FFF2-40B4-BE49-F238E27FC236}">
+                <a16:creationId xmlns:a16="http://schemas.microsoft.com/office/drawing/2014/main" id="{43CC1094-3CB9-1830-7711-54C1F2BE7FEB}"/>
+              </a:ext>
+            </a:extLst>
+          </p:cNvPr>
+          <p:cNvSpPr txBox="1"/>
+          <p:nvPr/>
+        </p:nvSpPr>
+        <p:spPr>
+          <a:xfrm>
+            <a:off x="406399" y="3123363"/>
+            <a:ext cx="2874505" cy="246221"/>
+          </a:xfrm>
+          <a:prstGeom prst="rect">
+            <a:avLst/>
+          </a:prstGeom>
+          <a:noFill/>
+        </p:spPr>
+        <p:txBody>
+          <a:bodyPr wrap="none" rtlCol="0">
+            <a:spAutoFit/>
+          </a:bodyPr>
+          <a:lstStyle/>
+          <a:p>
+            <a:r>
+              <a:rPr lang="en-US" altLang="ko-KR" sz="1000" dirty="0"/>
+              <a:t>DN</a:t>
+            </a:r>
+            <a:r>
+              <a:rPr lang="ko-KR" altLang="en-US" sz="1000" dirty="0"/>
+              <a:t> 는 </a:t>
+            </a:r>
+            <a:r>
+              <a:rPr lang="en-US" altLang="ko-KR" sz="1000" dirty="0"/>
+              <a:t>counting </a:t>
+            </a:r>
+            <a:r>
+              <a:rPr lang="ko-KR" altLang="en-US" sz="1000" dirty="0"/>
+              <a:t>완료 후에 </a:t>
+            </a:r>
+            <a:r>
+              <a:rPr lang="en-US" altLang="ko-KR" sz="1000" dirty="0"/>
+              <a:t>OFF,</a:t>
+            </a:r>
+            <a:r>
+              <a:rPr lang="ko-KR" altLang="en-US" sz="1000" dirty="0"/>
+              <a:t> </a:t>
+            </a:r>
+            <a:r>
+              <a:rPr lang="en-US" altLang="ko-KR" sz="1000" dirty="0"/>
+              <a:t>EN</a:t>
+            </a:r>
+            <a:r>
+              <a:rPr lang="ko-KR" altLang="en-US" sz="1000" dirty="0"/>
+              <a:t> </a:t>
+            </a:r>
+            <a:r>
+              <a:rPr lang="en-US" altLang="ko-KR" sz="1000" dirty="0"/>
+              <a:t>ON</a:t>
+            </a:r>
+            <a:r>
+              <a:rPr lang="ko-KR" altLang="en-US" sz="1000" dirty="0"/>
+              <a:t> 시 </a:t>
+            </a:r>
+            <a:r>
+              <a:rPr lang="en-US" altLang="ko-KR" sz="1000" dirty="0"/>
+              <a:t>ON</a:t>
+            </a:r>
+          </a:p>
+        </p:txBody>
+      </p:sp>
     </p:spTree>
     <p:extLst>
       <p:ext uri="{BB962C8B-B14F-4D97-AF65-F5344CB8AC3E}">
@@ -3941,6 +4202,66 @@
 </file>
 
 <file path=ppt/slides/slide6.xml><?xml version="1.0" encoding="utf-8"?>
+<p:sld xmlns:a="http://schemas.openxmlformats.org/drawingml/2006/main" xmlns:r="http://schemas.openxmlformats.org/officeDocument/2006/relationships" xmlns:p="http://schemas.openxmlformats.org/presentationml/2006/main">
+  <p:cSld>
+    <p:spTree>
+      <p:nvGrpSpPr>
+        <p:cNvPr id="1" name=""/>
+        <p:cNvGrpSpPr/>
+        <p:nvPr/>
+      </p:nvGrpSpPr>
+      <p:grpSpPr>
+        <a:xfrm>
+          <a:off x="0" y="0"/>
+          <a:ext cx="0" cy="0"/>
+          <a:chOff x="0" y="0"/>
+          <a:chExt cx="0" cy="0"/>
+        </a:xfrm>
+      </p:grpSpPr>
+      <p:pic>
+        <p:nvPicPr>
+          <p:cNvPr id="5" name="그림 4">
+            <a:extLst>
+              <a:ext uri="{FF2B5EF4-FFF2-40B4-BE49-F238E27FC236}">
+                <a16:creationId xmlns:a16="http://schemas.microsoft.com/office/drawing/2014/main" id="{5A5D607E-8C6D-F1DF-34B1-AB964DA7EB23}"/>
+              </a:ext>
+            </a:extLst>
+          </p:cNvPr>
+          <p:cNvPicPr>
+            <a:picLocks noChangeAspect="1"/>
+          </p:cNvPicPr>
+          <p:nvPr/>
+        </p:nvPicPr>
+        <p:blipFill>
+          <a:blip r:embed="rId2"/>
+          <a:stretch>
+            <a:fillRect/>
+          </a:stretch>
+        </p:blipFill>
+        <p:spPr>
+          <a:xfrm>
+            <a:off x="2828503" y="0"/>
+            <a:ext cx="6534993" cy="6858000"/>
+          </a:xfrm>
+          <a:prstGeom prst="rect">
+            <a:avLst/>
+          </a:prstGeom>
+        </p:spPr>
+      </p:pic>
+    </p:spTree>
+    <p:extLst>
+      <p:ext uri="{BB962C8B-B14F-4D97-AF65-F5344CB8AC3E}">
+        <p14:creationId xmlns:p14="http://schemas.microsoft.com/office/powerpoint/2010/main" val="5957759"/>
+      </p:ext>
+    </p:extLst>
+  </p:cSld>
+  <p:clrMapOvr>
+    <a:masterClrMapping/>
+  </p:clrMapOvr>
+</p:sld>
+</file>
+
+<file path=ppt/slides/slide7.xml><?xml version="1.0" encoding="utf-8"?>
 <p:sld xmlns:a="http://schemas.openxmlformats.org/drawingml/2006/main" xmlns:r="http://schemas.openxmlformats.org/officeDocument/2006/relationships" xmlns:p="http://schemas.openxmlformats.org/presentationml/2006/main">
   <p:cSld>
     <p:spTree>

</xml_diff>

<commit_message>
- RTO timer 구현 1차 완료
</commit_message>
<xml_diff>
--- a/DsDotNet/src/Engine/Engine.Core/Timer.pptx
+++ b/DsDotNet/src/Engine/Engine.Core/Timer.pptx
@@ -110,6 +110,11 @@
       </a:defRPr>
     </a:lvl9pPr>
   </p:defaultTextStyle>
+  <p:extLst>
+    <p:ext uri="{EFAFB233-063F-42B5-8137-9DF3F51BA10A}">
+      <p15:sldGuideLst xmlns:p15="http://schemas.microsoft.com/office/powerpoint/2012/main"/>
+    </p:ext>
+  </p:extLst>
 </p:presentation>
 </file>
 
@@ -4248,6 +4253,42 @@
           </a:prstGeom>
         </p:spPr>
       </p:pic>
+      <p:sp>
+        <p:nvSpPr>
+          <p:cNvPr id="2" name="제목 1">
+            <a:extLst>
+              <a:ext uri="{FF2B5EF4-FFF2-40B4-BE49-F238E27FC236}">
+                <a16:creationId xmlns:a16="http://schemas.microsoft.com/office/drawing/2014/main" id="{6D6B8BB5-AED8-D470-F312-7F19591DF635}"/>
+              </a:ext>
+            </a:extLst>
+          </p:cNvPr>
+          <p:cNvSpPr>
+            <a:spLocks noGrp="1"/>
+          </p:cNvSpPr>
+          <p:nvPr>
+            <p:ph type="title"/>
+          </p:nvPr>
+        </p:nvSpPr>
+        <p:spPr>
+          <a:xfrm>
+            <a:off x="117763" y="124979"/>
+            <a:ext cx="1526309" cy="604693"/>
+          </a:xfrm>
+        </p:spPr>
+        <p:txBody>
+          <a:bodyPr>
+            <a:normAutofit fontScale="90000"/>
+          </a:bodyPr>
+          <a:lstStyle/>
+          <a:p>
+            <a:r>
+              <a:rPr lang="en-US" altLang="ko-KR" dirty="0"/>
+              <a:t>TOF</a:t>
+            </a:r>
+            <a:endParaRPr lang="ko-KR" altLang="en-US" dirty="0"/>
+          </a:p>
+        </p:txBody>
+      </p:sp>
     </p:spTree>
     <p:extLst>
       <p:ext uri="{BB962C8B-B14F-4D97-AF65-F5344CB8AC3E}">
@@ -4336,7 +4377,7 @@
         </p:blipFill>
         <p:spPr>
           <a:xfrm>
-            <a:off x="1576387" y="976312"/>
+            <a:off x="1576387" y="1827646"/>
             <a:ext cx="9039225" cy="4905375"/>
           </a:xfrm>
           <a:prstGeom prst="rect">
@@ -4344,6 +4385,133 @@
           </a:prstGeom>
         </p:spPr>
       </p:pic>
+      <p:sp>
+        <p:nvSpPr>
+          <p:cNvPr id="5" name="TextBox 4">
+            <a:extLst>
+              <a:ext uri="{FF2B5EF4-FFF2-40B4-BE49-F238E27FC236}">
+                <a16:creationId xmlns:a16="http://schemas.microsoft.com/office/drawing/2014/main" id="{ED068C30-877C-DB08-06B0-870FEA547AFC}"/>
+              </a:ext>
+            </a:extLst>
+          </p:cNvPr>
+          <p:cNvSpPr txBox="1"/>
+          <p:nvPr/>
+        </p:nvSpPr>
+        <p:spPr>
+          <a:xfrm>
+            <a:off x="1715654" y="240574"/>
+            <a:ext cx="9469581" cy="1477328"/>
+          </a:xfrm>
+          <a:prstGeom prst="rect">
+            <a:avLst/>
+          </a:prstGeom>
+          <a:noFill/>
+        </p:spPr>
+        <p:txBody>
+          <a:bodyPr wrap="square">
+            <a:spAutoFit/>
+          </a:bodyPr>
+          <a:lstStyle/>
+          <a:p>
+            <a:r>
+              <a:rPr lang="en-US" altLang="ko-KR" dirty="0">
+                <a:effectLst/>
+                <a:latin typeface="Times New Roman" panose="02020603050405020304" pitchFamily="18" charset="0"/>
+              </a:rPr>
+              <a:t>The RTO instruction accumulates time until it is disabled. When the RTO</a:t>
+            </a:r>
+            <a:br>
+              <a:rPr lang="en-US" altLang="ko-KR" dirty="0"/>
+            </a:br>
+            <a:r>
+              <a:rPr lang="en-US" altLang="ko-KR" dirty="0">
+                <a:effectLst/>
+                <a:latin typeface="Times New Roman" panose="02020603050405020304" pitchFamily="18" charset="0"/>
+              </a:rPr>
+              <a:t>instruction is disabled, </a:t>
+            </a:r>
+            <a:r>
+              <a:rPr lang="en-US" altLang="ko-KR" dirty="0">
+                <a:solidFill>
+                  <a:srgbClr val="FF0000"/>
+                </a:solidFill>
+                <a:effectLst/>
+                <a:latin typeface="Times New Roman" panose="02020603050405020304" pitchFamily="18" charset="0"/>
+              </a:rPr>
+              <a:t>it retains its .ACC value</a:t>
+            </a:r>
+            <a:r>
+              <a:rPr lang="en-US" altLang="ko-KR" dirty="0">
+                <a:effectLst/>
+                <a:latin typeface="Times New Roman" panose="02020603050405020304" pitchFamily="18" charset="0"/>
+              </a:rPr>
+              <a:t>. You must clear the .ACC value,</a:t>
+            </a:r>
+            <a:br>
+              <a:rPr lang="en-US" altLang="ko-KR" dirty="0"/>
+            </a:br>
+            <a:r>
+              <a:rPr lang="en-US" altLang="ko-KR" dirty="0">
+                <a:effectLst/>
+                <a:latin typeface="Times New Roman" panose="02020603050405020304" pitchFamily="18" charset="0"/>
+              </a:rPr>
+              <a:t>typically with a </a:t>
+            </a:r>
+            <a:r>
+              <a:rPr lang="en-US" altLang="ko-KR" dirty="0">
+                <a:solidFill>
+                  <a:srgbClr val="FF0000"/>
+                </a:solidFill>
+                <a:effectLst/>
+                <a:latin typeface="Times New Roman" panose="02020603050405020304" pitchFamily="18" charset="0"/>
+              </a:rPr>
+              <a:t>RES instruction</a:t>
+            </a:r>
+            <a:r>
+              <a:rPr lang="en-US" altLang="ko-KR" dirty="0">
+                <a:effectLst/>
+                <a:latin typeface="Times New Roman" panose="02020603050405020304" pitchFamily="18" charset="0"/>
+              </a:rPr>
+              <a:t> referencing the same TIMER structure.</a:t>
+            </a:r>
+            <a:br>
+              <a:rPr lang="en-US" altLang="ko-KR" dirty="0"/>
+            </a:br>
+            <a:r>
+              <a:rPr lang="en-US" altLang="ko-KR" dirty="0">
+                <a:effectLst/>
+                <a:latin typeface="Times New Roman" panose="02020603050405020304" pitchFamily="18" charset="0"/>
+              </a:rPr>
+              <a:t>The time base is always 1 </a:t>
+            </a:r>
+            <a:r>
+              <a:rPr lang="en-US" altLang="ko-KR" dirty="0" err="1">
+                <a:effectLst/>
+                <a:latin typeface="Times New Roman" panose="02020603050405020304" pitchFamily="18" charset="0"/>
+              </a:rPr>
+              <a:t>ms.</a:t>
+            </a:r>
+            <a:r>
+              <a:rPr lang="en-US" altLang="ko-KR" dirty="0">
+                <a:effectLst/>
+                <a:latin typeface="Times New Roman" panose="02020603050405020304" pitchFamily="18" charset="0"/>
+              </a:rPr>
+              <a:t> For example, for a 2-second timer, enter 2000 for</a:t>
+            </a:r>
+            <a:br>
+              <a:rPr lang="en-US" altLang="ko-KR" dirty="0"/>
+            </a:br>
+            <a:r>
+              <a:rPr lang="en-US" altLang="ko-KR" dirty="0">
+                <a:effectLst/>
+                <a:latin typeface="Times New Roman" panose="02020603050405020304" pitchFamily="18" charset="0"/>
+              </a:rPr>
+              <a:t>the .PRE value</a:t>
+            </a:r>
+            <a:endParaRPr lang="ko-KR" altLang="en-US" dirty="0"/>
+          </a:p>
+        </p:txBody>
+      </p:sp>
     </p:spTree>
     <p:extLst>
       <p:ext uri="{BB962C8B-B14F-4D97-AF65-F5344CB8AC3E}">

</xml_diff>

<commit_message>
- CTU counter 구현 중.
</commit_message>
<xml_diff>
--- a/DsDotNet/src/Engine/Engine.Core/Timer.pptx
+++ b/DsDotNet/src/Engine/Engine.Core/Timer.pptx
@@ -12,6 +12,8 @@
     <p:sldId id="258" r:id="rId6"/>
     <p:sldId id="262" r:id="rId7"/>
     <p:sldId id="259" r:id="rId8"/>
+    <p:sldId id="263" r:id="rId9"/>
+    <p:sldId id="264" r:id="rId10"/>
   </p:sldIdLst>
   <p:sldSz cx="12192000" cy="6858000"/>
   <p:notesSz cx="6858000" cy="9144000"/>
@@ -4525,6 +4527,241 @@
 </p:sld>
 </file>
 
+<file path=ppt/slides/slide8.xml><?xml version="1.0" encoding="utf-8"?>
+<p:sld xmlns:a="http://schemas.openxmlformats.org/drawingml/2006/main" xmlns:r="http://schemas.openxmlformats.org/officeDocument/2006/relationships" xmlns:p="http://schemas.openxmlformats.org/presentationml/2006/main">
+  <p:cSld>
+    <p:spTree>
+      <p:nvGrpSpPr>
+        <p:cNvPr id="1" name=""/>
+        <p:cNvGrpSpPr/>
+        <p:nvPr/>
+      </p:nvGrpSpPr>
+      <p:grpSpPr>
+        <a:xfrm>
+          <a:off x="0" y="0"/>
+          <a:ext cx="0" cy="0"/>
+          <a:chOff x="0" y="0"/>
+          <a:chExt cx="0" cy="0"/>
+        </a:xfrm>
+      </p:grpSpPr>
+      <p:sp>
+        <p:nvSpPr>
+          <p:cNvPr id="4" name="제목 3">
+            <a:extLst>
+              <a:ext uri="{FF2B5EF4-FFF2-40B4-BE49-F238E27FC236}">
+                <a16:creationId xmlns:a16="http://schemas.microsoft.com/office/drawing/2014/main" id="{41B1E1A9-6AFD-E27C-2258-6496ED70FE19}"/>
+              </a:ext>
+            </a:extLst>
+          </p:cNvPr>
+          <p:cNvSpPr>
+            <a:spLocks noGrp="1"/>
+          </p:cNvSpPr>
+          <p:nvPr>
+            <p:ph type="ctrTitle"/>
+          </p:nvPr>
+        </p:nvSpPr>
+        <p:spPr/>
+        <p:txBody>
+          <a:bodyPr/>
+          <a:lstStyle/>
+          <a:p>
+            <a:r>
+              <a:rPr lang="en-US" altLang="ko-KR" dirty="0"/>
+              <a:t>COUNTER</a:t>
+            </a:r>
+            <a:endParaRPr lang="ko-KR" altLang="en-US" dirty="0"/>
+          </a:p>
+        </p:txBody>
+      </p:sp>
+      <p:sp>
+        <p:nvSpPr>
+          <p:cNvPr id="5" name="부제목 4">
+            <a:extLst>
+              <a:ext uri="{FF2B5EF4-FFF2-40B4-BE49-F238E27FC236}">
+                <a16:creationId xmlns:a16="http://schemas.microsoft.com/office/drawing/2014/main" id="{E9D93AD1-9BE9-7782-790D-E3D2F2C1662F}"/>
+              </a:ext>
+            </a:extLst>
+          </p:cNvPr>
+          <p:cNvSpPr>
+            <a:spLocks noGrp="1"/>
+          </p:cNvSpPr>
+          <p:nvPr>
+            <p:ph type="subTitle" idx="1"/>
+          </p:nvPr>
+        </p:nvSpPr>
+        <p:spPr/>
+        <p:txBody>
+          <a:bodyPr/>
+          <a:lstStyle/>
+          <a:p>
+            <a:endParaRPr lang="ko-KR" altLang="en-US"/>
+          </a:p>
+        </p:txBody>
+      </p:sp>
+    </p:spTree>
+    <p:extLst>
+      <p:ext uri="{BB962C8B-B14F-4D97-AF65-F5344CB8AC3E}">
+        <p14:creationId xmlns:p14="http://schemas.microsoft.com/office/powerpoint/2010/main" val="2273421396"/>
+      </p:ext>
+    </p:extLst>
+  </p:cSld>
+  <p:clrMapOvr>
+    <a:masterClrMapping/>
+  </p:clrMapOvr>
+</p:sld>
+</file>
+
+<file path=ppt/slides/slide9.xml><?xml version="1.0" encoding="utf-8"?>
+<p:sld xmlns:a="http://schemas.openxmlformats.org/drawingml/2006/main" xmlns:r="http://schemas.openxmlformats.org/officeDocument/2006/relationships" xmlns:p="http://schemas.openxmlformats.org/presentationml/2006/main">
+  <p:cSld>
+    <p:spTree>
+      <p:nvGrpSpPr>
+        <p:cNvPr id="1" name=""/>
+        <p:cNvGrpSpPr/>
+        <p:nvPr/>
+      </p:nvGrpSpPr>
+      <p:grpSpPr>
+        <a:xfrm>
+          <a:off x="0" y="0"/>
+          <a:ext cx="0" cy="0"/>
+          <a:chOff x="0" y="0"/>
+          <a:chExt cx="0" cy="0"/>
+        </a:xfrm>
+      </p:grpSpPr>
+      <p:pic>
+        <p:nvPicPr>
+          <p:cNvPr id="5" name="그림 4">
+            <a:extLst>
+              <a:ext uri="{FF2B5EF4-FFF2-40B4-BE49-F238E27FC236}">
+                <a16:creationId xmlns:a16="http://schemas.microsoft.com/office/drawing/2014/main" id="{2D031465-16DB-9C7C-11E0-954AF46AC467}"/>
+              </a:ext>
+            </a:extLst>
+          </p:cNvPr>
+          <p:cNvPicPr>
+            <a:picLocks noChangeAspect="1"/>
+          </p:cNvPicPr>
+          <p:nvPr/>
+        </p:nvPicPr>
+        <p:blipFill>
+          <a:blip r:embed="rId2"/>
+          <a:stretch>
+            <a:fillRect/>
+          </a:stretch>
+        </p:blipFill>
+        <p:spPr>
+          <a:xfrm>
+            <a:off x="1362075" y="1828800"/>
+            <a:ext cx="9467850" cy="3200400"/>
+          </a:xfrm>
+          <a:prstGeom prst="rect">
+            <a:avLst/>
+          </a:prstGeom>
+        </p:spPr>
+      </p:pic>
+      <p:sp>
+        <p:nvSpPr>
+          <p:cNvPr id="6" name="제목 1">
+            <a:extLst>
+              <a:ext uri="{FF2B5EF4-FFF2-40B4-BE49-F238E27FC236}">
+                <a16:creationId xmlns:a16="http://schemas.microsoft.com/office/drawing/2014/main" id="{D0CC2357-92A8-8690-7C20-3467415A7415}"/>
+              </a:ext>
+            </a:extLst>
+          </p:cNvPr>
+          <p:cNvSpPr txBox="1">
+            <a:spLocks/>
+          </p:cNvSpPr>
+          <p:nvPr/>
+        </p:nvSpPr>
+        <p:spPr>
+          <a:xfrm>
+            <a:off x="117763" y="124979"/>
+            <a:ext cx="1526309" cy="604693"/>
+          </a:xfrm>
+          <a:prstGeom prst="rect">
+            <a:avLst/>
+          </a:prstGeom>
+        </p:spPr>
+        <p:txBody>
+          <a:bodyPr vert="horz" lIns="91440" tIns="45720" rIns="91440" bIns="45720" rtlCol="0" anchor="ctr">
+            <a:normAutofit fontScale="90000" lnSpcReduction="10000"/>
+          </a:bodyPr>
+          <a:lstStyle>
+            <a:lvl1pPr algn="l" defTabSz="914400" rtl="0" eaLnBrk="1" latinLnBrk="1" hangingPunct="1">
+              <a:lnSpc>
+                <a:spcPct val="90000"/>
+              </a:lnSpc>
+              <a:spcBef>
+                <a:spcPct val="0"/>
+              </a:spcBef>
+              <a:buNone/>
+              <a:defRPr sz="4400" kern="1200">
+                <a:solidFill>
+                  <a:schemeClr val="tx1"/>
+                </a:solidFill>
+                <a:latin typeface="+mj-lt"/>
+                <a:ea typeface="+mj-ea"/>
+                <a:cs typeface="+mj-cs"/>
+              </a:defRPr>
+            </a:lvl1pPr>
+          </a:lstStyle>
+          <a:p>
+            <a:r>
+              <a:rPr lang="en-US" altLang="ko-KR" dirty="0"/>
+              <a:t>CTU</a:t>
+            </a:r>
+            <a:endParaRPr lang="ko-KR" altLang="en-US" dirty="0"/>
+          </a:p>
+        </p:txBody>
+      </p:sp>
+      <p:sp>
+        <p:nvSpPr>
+          <p:cNvPr id="7" name="TextBox 6">
+            <a:extLst>
+              <a:ext uri="{FF2B5EF4-FFF2-40B4-BE49-F238E27FC236}">
+                <a16:creationId xmlns:a16="http://schemas.microsoft.com/office/drawing/2014/main" id="{0650043B-88A0-7279-B89D-5070D8811789}"/>
+              </a:ext>
+            </a:extLst>
+          </p:cNvPr>
+          <p:cNvSpPr txBox="1"/>
+          <p:nvPr/>
+        </p:nvSpPr>
+        <p:spPr>
+          <a:xfrm>
+            <a:off x="465909" y="2037805"/>
+            <a:ext cx="1039067" cy="369332"/>
+          </a:xfrm>
+          <a:prstGeom prst="rect">
+            <a:avLst/>
+          </a:prstGeom>
+          <a:noFill/>
+        </p:spPr>
+        <p:txBody>
+          <a:bodyPr wrap="none" rtlCol="0">
+            <a:spAutoFit/>
+          </a:bodyPr>
+          <a:lstStyle/>
+          <a:p>
+            <a:r>
+              <a:rPr lang="en-US" altLang="ko-KR" dirty="0"/>
+              <a:t>.CU, .CD</a:t>
+            </a:r>
+            <a:endParaRPr lang="ko-KR" altLang="en-US" dirty="0"/>
+          </a:p>
+        </p:txBody>
+      </p:sp>
+    </p:spTree>
+    <p:extLst>
+      <p:ext uri="{BB962C8B-B14F-4D97-AF65-F5344CB8AC3E}">
+        <p14:creationId xmlns:p14="http://schemas.microsoft.com/office/powerpoint/2010/main" val="1978222640"/>
+      </p:ext>
+    </p:extLst>
+  </p:cSld>
+  <p:clrMapOvr>
+    <a:masterClrMapping/>
+  </p:clrMapOvr>
+</p:sld>
+</file>
+
 <file path=ppt/theme/theme1.xml><?xml version="1.0" encoding="utf-8"?>
 <a:theme xmlns:a="http://schemas.openxmlformats.org/drawingml/2006/main" name="Office 테마">
   <a:themeElements>

</xml_diff>

<commit_message>
- CTR (Ring counter 구현)
</commit_message>
<xml_diff>
--- a/DsDotNet/src/Engine/Engine.Core/Timer.pptx
+++ b/DsDotNet/src/Engine/Engine.Core/Timer.pptx
@@ -14,11 +14,13 @@
     <p:sldId id="259" r:id="rId8"/>
     <p:sldId id="263" r:id="rId9"/>
     <p:sldId id="264" r:id="rId10"/>
-    <p:sldId id="265" r:id="rId11"/>
-    <p:sldId id="266" r:id="rId12"/>
-    <p:sldId id="267" r:id="rId13"/>
-    <p:sldId id="268" r:id="rId14"/>
-    <p:sldId id="269" r:id="rId15"/>
+    <p:sldId id="271" r:id="rId11"/>
+    <p:sldId id="270" r:id="rId12"/>
+    <p:sldId id="265" r:id="rId13"/>
+    <p:sldId id="266" r:id="rId14"/>
+    <p:sldId id="267" r:id="rId15"/>
+    <p:sldId id="268" r:id="rId16"/>
+    <p:sldId id="269" r:id="rId17"/>
   </p:sldIdLst>
   <p:sldSz cx="12192000" cy="6858000"/>
   <p:notesSz cx="6858000" cy="9144000"/>
@@ -3428,6 +3430,202 @@
           <p:cNvPr id="2" name="제목 1">
             <a:extLst>
               <a:ext uri="{FF2B5EF4-FFF2-40B4-BE49-F238E27FC236}">
+                <a16:creationId xmlns:a16="http://schemas.microsoft.com/office/drawing/2014/main" id="{0D8B5E7A-DC4F-3BDC-EAF1-5843624CF4F2}"/>
+              </a:ext>
+            </a:extLst>
+          </p:cNvPr>
+          <p:cNvSpPr>
+            <a:spLocks noGrp="1"/>
+          </p:cNvSpPr>
+          <p:nvPr>
+            <p:ph type="title"/>
+          </p:nvPr>
+        </p:nvSpPr>
+        <p:spPr>
+          <a:xfrm>
+            <a:off x="313888" y="268652"/>
+            <a:ext cx="2261532" cy="561858"/>
+          </a:xfrm>
+        </p:spPr>
+        <p:txBody>
+          <a:bodyPr>
+            <a:normAutofit fontScale="90000"/>
+          </a:bodyPr>
+          <a:lstStyle/>
+          <a:p>
+            <a:r>
+              <a:rPr lang="en-US" altLang="ko-KR"/>
+              <a:t>CTU (AB)</a:t>
+            </a:r>
+            <a:endParaRPr lang="ko-KR" altLang="en-US" dirty="0"/>
+          </a:p>
+        </p:txBody>
+      </p:sp>
+      <p:pic>
+        <p:nvPicPr>
+          <p:cNvPr id="5" name="그림 4">
+            <a:extLst>
+              <a:ext uri="{FF2B5EF4-FFF2-40B4-BE49-F238E27FC236}">
+                <a16:creationId xmlns:a16="http://schemas.microsoft.com/office/drawing/2014/main" id="{29426A75-0A20-CF9C-2FF2-9513282CDA24}"/>
+              </a:ext>
+            </a:extLst>
+          </p:cNvPr>
+          <p:cNvPicPr>
+            <a:picLocks noChangeAspect="1"/>
+          </p:cNvPicPr>
+          <p:nvPr/>
+        </p:nvPicPr>
+        <p:blipFill>
+          <a:blip r:embed="rId2"/>
+          <a:stretch>
+            <a:fillRect/>
+          </a:stretch>
+        </p:blipFill>
+        <p:spPr>
+          <a:xfrm>
+            <a:off x="1862137" y="1023937"/>
+            <a:ext cx="8467725" cy="4810125"/>
+          </a:xfrm>
+          <a:prstGeom prst="rect">
+            <a:avLst/>
+          </a:prstGeom>
+        </p:spPr>
+      </p:pic>
+    </p:spTree>
+    <p:extLst>
+      <p:ext uri="{BB962C8B-B14F-4D97-AF65-F5344CB8AC3E}">
+        <p14:creationId xmlns:p14="http://schemas.microsoft.com/office/powerpoint/2010/main" val="448238874"/>
+      </p:ext>
+    </p:extLst>
+  </p:cSld>
+  <p:clrMapOvr>
+    <a:masterClrMapping/>
+  </p:clrMapOvr>
+</p:sld>
+</file>
+
+<file path=ppt/slides/slide11.xml><?xml version="1.0" encoding="utf-8"?>
+<p:sld xmlns:a="http://schemas.openxmlformats.org/drawingml/2006/main" xmlns:r="http://schemas.openxmlformats.org/officeDocument/2006/relationships" xmlns:p="http://schemas.openxmlformats.org/presentationml/2006/main">
+  <p:cSld>
+    <p:spTree>
+      <p:nvGrpSpPr>
+        <p:cNvPr id="1" name=""/>
+        <p:cNvGrpSpPr/>
+        <p:nvPr/>
+      </p:nvGrpSpPr>
+      <p:grpSpPr>
+        <a:xfrm>
+          <a:off x="0" y="0"/>
+          <a:ext cx="0" cy="0"/>
+          <a:chOff x="0" y="0"/>
+          <a:chExt cx="0" cy="0"/>
+        </a:xfrm>
+      </p:grpSpPr>
+      <p:sp>
+        <p:nvSpPr>
+          <p:cNvPr id="2" name="제목 1">
+            <a:extLst>
+              <a:ext uri="{FF2B5EF4-FFF2-40B4-BE49-F238E27FC236}">
+                <a16:creationId xmlns:a16="http://schemas.microsoft.com/office/drawing/2014/main" id="{2245338D-1F5A-51DF-0067-3163797DCB94}"/>
+              </a:ext>
+            </a:extLst>
+          </p:cNvPr>
+          <p:cNvSpPr>
+            <a:spLocks noGrp="1"/>
+          </p:cNvSpPr>
+          <p:nvPr>
+            <p:ph type="title"/>
+          </p:nvPr>
+        </p:nvSpPr>
+        <p:spPr>
+          <a:xfrm>
+            <a:off x="74802" y="58927"/>
+            <a:ext cx="2448902" cy="649944"/>
+          </a:xfrm>
+        </p:spPr>
+        <p:txBody>
+          <a:bodyPr>
+            <a:normAutofit/>
+          </a:bodyPr>
+          <a:lstStyle/>
+          <a:p>
+            <a:r>
+              <a:rPr lang="ko-KR" altLang="en-US" sz="2800" dirty="0"/>
+              <a:t>산전 </a:t>
+            </a:r>
+            <a:r>
+              <a:rPr lang="en-US" altLang="ko-KR" sz="2800" dirty="0"/>
+              <a:t>counter</a:t>
+            </a:r>
+            <a:endParaRPr lang="ko-KR" altLang="en-US" sz="2800" dirty="0"/>
+          </a:p>
+        </p:txBody>
+      </p:sp>
+      <p:pic>
+        <p:nvPicPr>
+          <p:cNvPr id="5" name="그림 4">
+            <a:extLst>
+              <a:ext uri="{FF2B5EF4-FFF2-40B4-BE49-F238E27FC236}">
+                <a16:creationId xmlns:a16="http://schemas.microsoft.com/office/drawing/2014/main" id="{984CE43A-F2FA-7796-24F8-312CE2FD5863}"/>
+              </a:ext>
+            </a:extLst>
+          </p:cNvPr>
+          <p:cNvPicPr>
+            <a:picLocks noChangeAspect="1"/>
+          </p:cNvPicPr>
+          <p:nvPr/>
+        </p:nvPicPr>
+        <p:blipFill>
+          <a:blip r:embed="rId2"/>
+          <a:stretch>
+            <a:fillRect/>
+          </a:stretch>
+        </p:blipFill>
+        <p:spPr>
+          <a:xfrm>
+            <a:off x="2523704" y="0"/>
+            <a:ext cx="7144591" cy="6858000"/>
+          </a:xfrm>
+          <a:prstGeom prst="rect">
+            <a:avLst/>
+          </a:prstGeom>
+        </p:spPr>
+      </p:pic>
+    </p:spTree>
+    <p:extLst>
+      <p:ext uri="{BB962C8B-B14F-4D97-AF65-F5344CB8AC3E}">
+        <p14:creationId xmlns:p14="http://schemas.microsoft.com/office/powerpoint/2010/main" val="1003128740"/>
+      </p:ext>
+    </p:extLst>
+  </p:cSld>
+  <p:clrMapOvr>
+    <a:masterClrMapping/>
+  </p:clrMapOvr>
+</p:sld>
+</file>
+
+<file path=ppt/slides/slide12.xml><?xml version="1.0" encoding="utf-8"?>
+<p:sld xmlns:a="http://schemas.openxmlformats.org/drawingml/2006/main" xmlns:r="http://schemas.openxmlformats.org/officeDocument/2006/relationships" xmlns:p="http://schemas.openxmlformats.org/presentationml/2006/main">
+  <p:cSld>
+    <p:spTree>
+      <p:nvGrpSpPr>
+        <p:cNvPr id="1" name=""/>
+        <p:cNvGrpSpPr/>
+        <p:nvPr/>
+      </p:nvGrpSpPr>
+      <p:grpSpPr>
+        <a:xfrm>
+          <a:off x="0" y="0"/>
+          <a:ext cx="0" cy="0"/>
+          <a:chOff x="0" y="0"/>
+          <a:chExt cx="0" cy="0"/>
+        </a:xfrm>
+      </p:grpSpPr>
+      <p:sp>
+        <p:nvSpPr>
+          <p:cNvPr id="2" name="제목 1">
+            <a:extLst>
+              <a:ext uri="{FF2B5EF4-FFF2-40B4-BE49-F238E27FC236}">
                 <a16:creationId xmlns:a16="http://schemas.microsoft.com/office/drawing/2014/main" id="{DDC757F2-A588-55CE-AB29-82077923FFA8}"/>
               </a:ext>
             </a:extLst>
@@ -4388,997 +4586,6 @@
 </p:sld>
 </file>
 
-<file path=ppt/slides/slide11.xml><?xml version="1.0" encoding="utf-8"?>
-<p:sld xmlns:a="http://schemas.openxmlformats.org/drawingml/2006/main" xmlns:r="http://schemas.openxmlformats.org/officeDocument/2006/relationships" xmlns:p="http://schemas.openxmlformats.org/presentationml/2006/main">
-  <p:cSld>
-    <p:spTree>
-      <p:nvGrpSpPr>
-        <p:cNvPr id="1" name=""/>
-        <p:cNvGrpSpPr/>
-        <p:nvPr/>
-      </p:nvGrpSpPr>
-      <p:grpSpPr>
-        <a:xfrm>
-          <a:off x="0" y="0"/>
-          <a:ext cx="0" cy="0"/>
-          <a:chOff x="0" y="0"/>
-          <a:chExt cx="0" cy="0"/>
-        </a:xfrm>
-      </p:grpSpPr>
-      <p:sp>
-        <p:nvSpPr>
-          <p:cNvPr id="2" name="제목 1">
-            <a:extLst>
-              <a:ext uri="{FF2B5EF4-FFF2-40B4-BE49-F238E27FC236}">
-                <a16:creationId xmlns:a16="http://schemas.microsoft.com/office/drawing/2014/main" id="{1B5AB5BE-0CEB-62D1-287B-7A8FB8BC868A}"/>
-              </a:ext>
-            </a:extLst>
-          </p:cNvPr>
-          <p:cNvSpPr>
-            <a:spLocks noGrp="1"/>
-          </p:cNvSpPr>
-          <p:nvPr>
-            <p:ph type="title"/>
-          </p:nvPr>
-        </p:nvSpPr>
-        <p:spPr/>
-        <p:txBody>
-          <a:bodyPr/>
-          <a:lstStyle/>
-          <a:p>
-            <a:r>
-              <a:rPr lang="en-US" altLang="ko-KR" dirty="0"/>
-              <a:t>Classes : Timer/Counter top level</a:t>
-            </a:r>
-            <a:endParaRPr lang="ko-KR" altLang="en-US" dirty="0"/>
-          </a:p>
-        </p:txBody>
-      </p:sp>
-      <p:sp>
-        <p:nvSpPr>
-          <p:cNvPr id="5" name="TextBox 4">
-            <a:extLst>
-              <a:ext uri="{FF2B5EF4-FFF2-40B4-BE49-F238E27FC236}">
-                <a16:creationId xmlns:a16="http://schemas.microsoft.com/office/drawing/2014/main" id="{97A82AB5-B6A3-7DF3-7F5D-F0EAA673A0E9}"/>
-              </a:ext>
-            </a:extLst>
-          </p:cNvPr>
-          <p:cNvSpPr txBox="1"/>
-          <p:nvPr/>
-        </p:nvSpPr>
-        <p:spPr>
-          <a:xfrm>
-            <a:off x="951344" y="1889174"/>
-            <a:ext cx="9938329" cy="3970318"/>
-          </a:xfrm>
-          <a:prstGeom prst="rect">
-            <a:avLst/>
-          </a:prstGeom>
-          <a:noFill/>
-        </p:spPr>
-        <p:txBody>
-          <a:bodyPr wrap="square">
-            <a:spAutoFit/>
-          </a:bodyPr>
-          <a:lstStyle/>
-          <a:p>
-            <a:r>
-              <a:rPr lang="en-US" altLang="ko-KR" sz="1400" dirty="0">
-                <a:solidFill>
-                  <a:srgbClr val="0000FF"/>
-                </a:solidFill>
-                <a:latin typeface="Cascadia Mono" panose="020B0609020000020004" pitchFamily="49" charset="0"/>
-              </a:rPr>
-              <a:t>type</a:t>
-            </a:r>
-            <a:r>
-              <a:rPr lang="en-US" altLang="ko-KR" sz="1400" dirty="0">
-                <a:solidFill>
-                  <a:srgbClr val="000000"/>
-                </a:solidFill>
-                <a:latin typeface="Cascadia Mono" panose="020B0609020000020004" pitchFamily="49" charset="0"/>
-              </a:rPr>
-              <a:t> Statement =</a:t>
-            </a:r>
-          </a:p>
-          <a:p>
-            <a:r>
-              <a:rPr lang="en-US" altLang="ko-KR" sz="1400" dirty="0">
-                <a:solidFill>
-                  <a:srgbClr val="000000"/>
-                </a:solidFill>
-                <a:latin typeface="Cascadia Mono" panose="020B0609020000020004" pitchFamily="49" charset="0"/>
-              </a:rPr>
-              <a:t>        | DuAssign </a:t>
-            </a:r>
-            <a:r>
-              <a:rPr lang="en-US" altLang="ko-KR" sz="1400" dirty="0">
-                <a:solidFill>
-                  <a:srgbClr val="0000FF"/>
-                </a:solidFill>
-                <a:latin typeface="Cascadia Mono" panose="020B0609020000020004" pitchFamily="49" charset="0"/>
-              </a:rPr>
-              <a:t>of</a:t>
-            </a:r>
-            <a:r>
-              <a:rPr lang="en-US" altLang="ko-KR" sz="1400" dirty="0">
-                <a:solidFill>
-                  <a:srgbClr val="000000"/>
-                </a:solidFill>
-                <a:latin typeface="Cascadia Mono" panose="020B0609020000020004" pitchFamily="49" charset="0"/>
-              </a:rPr>
-              <a:t> expression:IExpression * target:IStorage</a:t>
-            </a:r>
-          </a:p>
-          <a:p>
-            <a:r>
-              <a:rPr lang="en-US" altLang="ko-KR" sz="1400" dirty="0">
-                <a:solidFill>
-                  <a:srgbClr val="000000"/>
-                </a:solidFill>
-                <a:latin typeface="Cascadia Mono" panose="020B0609020000020004" pitchFamily="49" charset="0"/>
-              </a:rPr>
-              <a:t>        | DuVarDecl </a:t>
-            </a:r>
-            <a:r>
-              <a:rPr lang="en-US" altLang="ko-KR" sz="1400" dirty="0">
-                <a:solidFill>
-                  <a:srgbClr val="0000FF"/>
-                </a:solidFill>
-                <a:latin typeface="Cascadia Mono" panose="020B0609020000020004" pitchFamily="49" charset="0"/>
-              </a:rPr>
-              <a:t>of</a:t>
-            </a:r>
-            <a:r>
-              <a:rPr lang="en-US" altLang="ko-KR" sz="1400" dirty="0">
-                <a:solidFill>
-                  <a:srgbClr val="000000"/>
-                </a:solidFill>
-                <a:latin typeface="Cascadia Mono" panose="020B0609020000020004" pitchFamily="49" charset="0"/>
-              </a:rPr>
-              <a:t> expression:IExpression * variable:IStorage</a:t>
-            </a:r>
-          </a:p>
-          <a:p>
-            <a:r>
-              <a:rPr lang="en-US" altLang="ko-KR" sz="1400" dirty="0">
-                <a:solidFill>
-                  <a:srgbClr val="000000"/>
-                </a:solidFill>
-                <a:latin typeface="Cascadia Mono" panose="020B0609020000020004" pitchFamily="49" charset="0"/>
-              </a:rPr>
-              <a:t>        | DuTimer </a:t>
-            </a:r>
-            <a:r>
-              <a:rPr lang="en-US" altLang="ko-KR" sz="1400" dirty="0">
-                <a:solidFill>
-                  <a:srgbClr val="0000FF"/>
-                </a:solidFill>
-                <a:latin typeface="Cascadia Mono" panose="020B0609020000020004" pitchFamily="49" charset="0"/>
-              </a:rPr>
-              <a:t>of</a:t>
-            </a:r>
-            <a:r>
-              <a:rPr lang="en-US" altLang="ko-KR" sz="1400" dirty="0">
-                <a:solidFill>
-                  <a:srgbClr val="000000"/>
-                </a:solidFill>
-                <a:latin typeface="Cascadia Mono" panose="020B0609020000020004" pitchFamily="49" charset="0"/>
-              </a:rPr>
-              <a:t> TimerStatement</a:t>
-            </a:r>
-          </a:p>
-          <a:p>
-            <a:r>
-              <a:rPr lang="en-US" altLang="ko-KR" sz="1400" dirty="0">
-                <a:solidFill>
-                  <a:srgbClr val="000000"/>
-                </a:solidFill>
-                <a:latin typeface="Cascadia Mono" panose="020B0609020000020004" pitchFamily="49" charset="0"/>
-              </a:rPr>
-              <a:t>        | DuCounter </a:t>
-            </a:r>
-            <a:r>
-              <a:rPr lang="en-US" altLang="ko-KR" sz="1400" dirty="0">
-                <a:solidFill>
-                  <a:srgbClr val="0000FF"/>
-                </a:solidFill>
-                <a:latin typeface="Cascadia Mono" panose="020B0609020000020004" pitchFamily="49" charset="0"/>
-              </a:rPr>
-              <a:t>of</a:t>
-            </a:r>
-            <a:r>
-              <a:rPr lang="en-US" altLang="ko-KR" sz="1400" dirty="0">
-                <a:solidFill>
-                  <a:srgbClr val="000000"/>
-                </a:solidFill>
-                <a:latin typeface="Cascadia Mono" panose="020B0609020000020004" pitchFamily="49" charset="0"/>
-              </a:rPr>
-              <a:t> CounterStatement</a:t>
-            </a:r>
-          </a:p>
-          <a:p>
-            <a:endParaRPr lang="en-US" altLang="ko-KR" sz="1400" dirty="0">
-              <a:solidFill>
-                <a:srgbClr val="000000"/>
-              </a:solidFill>
-              <a:latin typeface="Cascadia Mono" panose="020B0609020000020004" pitchFamily="49" charset="0"/>
-            </a:endParaRPr>
-          </a:p>
-          <a:p>
-            <a:r>
-              <a:rPr lang="en-US" altLang="ko-KR" sz="1400" dirty="0">
-                <a:solidFill>
-                  <a:srgbClr val="0000FF"/>
-                </a:solidFill>
-                <a:latin typeface="Cascadia Mono" panose="020B0609020000020004" pitchFamily="49" charset="0"/>
-              </a:rPr>
-              <a:t>type</a:t>
-            </a:r>
-            <a:r>
-              <a:rPr lang="en-US" altLang="ko-KR" sz="1400" dirty="0">
-                <a:solidFill>
-                  <a:srgbClr val="000000"/>
-                </a:solidFill>
-                <a:latin typeface="Cascadia Mono" panose="020B0609020000020004" pitchFamily="49" charset="0"/>
-              </a:rPr>
-              <a:t> TimerStatement = {</a:t>
-            </a:r>
-          </a:p>
-          <a:p>
-            <a:r>
-              <a:rPr lang="en-US" altLang="ko-KR" sz="1400" dirty="0">
-                <a:solidFill>
-                  <a:srgbClr val="000000"/>
-                </a:solidFill>
-                <a:latin typeface="Cascadia Mono" panose="020B0609020000020004" pitchFamily="49" charset="0"/>
-              </a:rPr>
-              <a:t>    Timer:</a:t>
-            </a:r>
-            <a:r>
-              <a:rPr lang="en-US" altLang="ko-KR" sz="1400" dirty="0">
-                <a:solidFill>
-                  <a:srgbClr val="FF0000"/>
-                </a:solidFill>
-                <a:latin typeface="Cascadia Mono" panose="020B0609020000020004" pitchFamily="49" charset="0"/>
-              </a:rPr>
-              <a:t>Timer</a:t>
-            </a:r>
-          </a:p>
-          <a:p>
-            <a:r>
-              <a:rPr lang="en-US" altLang="ko-KR" sz="1400" dirty="0">
-                <a:solidFill>
-                  <a:srgbClr val="000000"/>
-                </a:solidFill>
-                <a:latin typeface="Cascadia Mono" panose="020B0609020000020004" pitchFamily="49" charset="0"/>
-              </a:rPr>
-              <a:t>    RungInCondition: IExpression&lt;bool&gt; option</a:t>
-            </a:r>
-          </a:p>
-          <a:p>
-            <a:r>
-              <a:rPr lang="en-US" altLang="ko-KR" sz="1400" dirty="0">
-                <a:solidFill>
-                  <a:srgbClr val="000000"/>
-                </a:solidFill>
-                <a:latin typeface="Cascadia Mono" panose="020B0609020000020004" pitchFamily="49" charset="0"/>
-              </a:rPr>
-              <a:t>    ResetCondition:  IExpression&lt;bool&gt; option</a:t>
-            </a:r>
-          </a:p>
-          <a:p>
-            <a:r>
-              <a:rPr lang="en-US" altLang="ko-KR" sz="1400" dirty="0">
-                <a:solidFill>
-                  <a:srgbClr val="000000"/>
-                </a:solidFill>
-                <a:latin typeface="Cascadia Mono" panose="020B0609020000020004" pitchFamily="49" charset="0"/>
-              </a:rPr>
-              <a:t>}</a:t>
-            </a:r>
-          </a:p>
-          <a:p>
-            <a:endParaRPr lang="ko-KR" altLang="en-US" sz="1400" dirty="0">
-              <a:solidFill>
-                <a:srgbClr val="000000"/>
-              </a:solidFill>
-              <a:latin typeface="Cascadia Mono" panose="020B0609020000020004" pitchFamily="49" charset="0"/>
-            </a:endParaRPr>
-          </a:p>
-          <a:p>
-            <a:r>
-              <a:rPr lang="en-US" altLang="ko-KR" sz="1400" dirty="0">
-                <a:solidFill>
-                  <a:srgbClr val="0000FF"/>
-                </a:solidFill>
-                <a:latin typeface="Cascadia Mono" panose="020B0609020000020004" pitchFamily="49" charset="0"/>
-              </a:rPr>
-              <a:t>type</a:t>
-            </a:r>
-            <a:r>
-              <a:rPr lang="en-US" altLang="ko-KR" sz="1400" dirty="0">
-                <a:solidFill>
-                  <a:srgbClr val="000000"/>
-                </a:solidFill>
-                <a:latin typeface="Cascadia Mono" panose="020B0609020000020004" pitchFamily="49" charset="0"/>
-              </a:rPr>
-              <a:t> CounterStatement = {</a:t>
-            </a:r>
-          </a:p>
-          <a:p>
-            <a:r>
-              <a:rPr lang="en-US" altLang="ko-KR" sz="1400" dirty="0">
-                <a:solidFill>
-                  <a:srgbClr val="000000"/>
-                </a:solidFill>
-                <a:latin typeface="Cascadia Mono" panose="020B0609020000020004" pitchFamily="49" charset="0"/>
-              </a:rPr>
-              <a:t>    Counter:Counter</a:t>
-            </a:r>
-          </a:p>
-          <a:p>
-            <a:r>
-              <a:rPr lang="en-US" altLang="ko-KR" sz="1400" dirty="0">
-                <a:solidFill>
-                  <a:srgbClr val="000000"/>
-                </a:solidFill>
-                <a:latin typeface="Cascadia Mono" panose="020B0609020000020004" pitchFamily="49" charset="0"/>
-              </a:rPr>
-              <a:t>    UpCondition: IExpression&lt;bool&gt; option</a:t>
-            </a:r>
-          </a:p>
-          <a:p>
-            <a:r>
-              <a:rPr lang="en-US" altLang="ko-KR" sz="1400" dirty="0">
-                <a:solidFill>
-                  <a:srgbClr val="000000"/>
-                </a:solidFill>
-                <a:latin typeface="Cascadia Mono" panose="020B0609020000020004" pitchFamily="49" charset="0"/>
-              </a:rPr>
-              <a:t>    DownCondition: IExpression&lt;bool&gt; option</a:t>
-            </a:r>
-          </a:p>
-          <a:p>
-            <a:r>
-              <a:rPr lang="en-US" altLang="ko-KR" sz="1400" dirty="0">
-                <a:solidFill>
-                  <a:srgbClr val="000000"/>
-                </a:solidFill>
-                <a:latin typeface="Cascadia Mono" panose="020B0609020000020004" pitchFamily="49" charset="0"/>
-              </a:rPr>
-              <a:t>    ResetCondition:  IExpression&lt;bool&gt; option</a:t>
-            </a:r>
-          </a:p>
-          <a:p>
-            <a:r>
-              <a:rPr lang="en-US" altLang="ko-KR" sz="1400" dirty="0">
-                <a:solidFill>
-                  <a:srgbClr val="000000"/>
-                </a:solidFill>
-                <a:latin typeface="Cascadia Mono" panose="020B0609020000020004" pitchFamily="49" charset="0"/>
-              </a:rPr>
-              <a:t>}</a:t>
-            </a:r>
-          </a:p>
-        </p:txBody>
-      </p:sp>
-    </p:spTree>
-    <p:extLst>
-      <p:ext uri="{BB962C8B-B14F-4D97-AF65-F5344CB8AC3E}">
-        <p14:creationId xmlns:p14="http://schemas.microsoft.com/office/powerpoint/2010/main" val="3044527727"/>
-      </p:ext>
-    </p:extLst>
-  </p:cSld>
-  <p:clrMapOvr>
-    <a:masterClrMapping/>
-  </p:clrMapOvr>
-</p:sld>
-</file>
-
-<file path=ppt/slides/slide12.xml><?xml version="1.0" encoding="utf-8"?>
-<p:sld xmlns:a="http://schemas.openxmlformats.org/drawingml/2006/main" xmlns:r="http://schemas.openxmlformats.org/officeDocument/2006/relationships" xmlns:p="http://schemas.openxmlformats.org/presentationml/2006/main">
-  <p:cSld>
-    <p:spTree>
-      <p:nvGrpSpPr>
-        <p:cNvPr id="1" name=""/>
-        <p:cNvGrpSpPr/>
-        <p:nvPr/>
-      </p:nvGrpSpPr>
-      <p:grpSpPr>
-        <a:xfrm>
-          <a:off x="0" y="0"/>
-          <a:ext cx="0" cy="0"/>
-          <a:chOff x="0" y="0"/>
-          <a:chExt cx="0" cy="0"/>
-        </a:xfrm>
-      </p:grpSpPr>
-      <p:sp>
-        <p:nvSpPr>
-          <p:cNvPr id="2" name="제목 1">
-            <a:extLst>
-              <a:ext uri="{FF2B5EF4-FFF2-40B4-BE49-F238E27FC236}">
-                <a16:creationId xmlns:a16="http://schemas.microsoft.com/office/drawing/2014/main" id="{5EB18DC9-FC2F-0591-7F29-6E1E653363F3}"/>
-              </a:ext>
-            </a:extLst>
-          </p:cNvPr>
-          <p:cNvSpPr>
-            <a:spLocks noGrp="1"/>
-          </p:cNvSpPr>
-          <p:nvPr>
-            <p:ph type="title"/>
-          </p:nvPr>
-        </p:nvSpPr>
-        <p:spPr/>
-        <p:txBody>
-          <a:bodyPr/>
-          <a:lstStyle/>
-          <a:p>
-            <a:r>
-              <a:rPr lang="en-US" altLang="ko-KR" dirty="0"/>
-              <a:t>Classes : Timer statements</a:t>
-            </a:r>
-            <a:endParaRPr lang="ko-KR" altLang="en-US" dirty="0"/>
-          </a:p>
-        </p:txBody>
-      </p:sp>
-      <p:sp>
-        <p:nvSpPr>
-          <p:cNvPr id="5" name="TextBox 4">
-            <a:extLst>
-              <a:ext uri="{FF2B5EF4-FFF2-40B4-BE49-F238E27FC236}">
-                <a16:creationId xmlns:a16="http://schemas.microsoft.com/office/drawing/2014/main" id="{8E9067D1-0ED2-925C-8C37-9111D6743EA1}"/>
-              </a:ext>
-            </a:extLst>
-          </p:cNvPr>
-          <p:cNvSpPr txBox="1"/>
-          <p:nvPr/>
-        </p:nvSpPr>
-        <p:spPr>
-          <a:xfrm>
-            <a:off x="838200" y="1880581"/>
-            <a:ext cx="10594109" cy="4524315"/>
-          </a:xfrm>
-          <a:prstGeom prst="rect">
-            <a:avLst/>
-          </a:prstGeom>
-          <a:noFill/>
-        </p:spPr>
-        <p:txBody>
-          <a:bodyPr wrap="square">
-            <a:spAutoFit/>
-          </a:bodyPr>
-          <a:lstStyle/>
-          <a:p>
-            <a:r>
-              <a:rPr lang="en-US" altLang="ko-KR" sz="1800" dirty="0">
-                <a:solidFill>
-                  <a:srgbClr val="0000FF"/>
-                </a:solidFill>
-                <a:latin typeface="Cascadia Mono" panose="020B0609020000020004" pitchFamily="49" charset="0"/>
-              </a:rPr>
-              <a:t>type</a:t>
-            </a:r>
-            <a:r>
-              <a:rPr lang="en-US" altLang="ko-KR" sz="1800" dirty="0">
-                <a:solidFill>
-                  <a:srgbClr val="000000"/>
-                </a:solidFill>
-                <a:latin typeface="Cascadia Mono" panose="020B0609020000020004" pitchFamily="49" charset="0"/>
-              </a:rPr>
-              <a:t> Timer </a:t>
-            </a:r>
-            <a:r>
-              <a:rPr lang="en-US" altLang="ko-KR" sz="1800" dirty="0">
-                <a:solidFill>
-                  <a:srgbClr val="0000FF"/>
-                </a:solidFill>
-                <a:latin typeface="Cascadia Mono" panose="020B0609020000020004" pitchFamily="49" charset="0"/>
-              </a:rPr>
-              <a:t>internal</a:t>
-            </a:r>
-            <a:r>
-              <a:rPr lang="en-US" altLang="ko-KR" sz="1800" dirty="0">
-                <a:solidFill>
-                  <a:srgbClr val="000000"/>
-                </a:solidFill>
-                <a:latin typeface="Cascadia Mono" panose="020B0609020000020004" pitchFamily="49" charset="0"/>
-              </a:rPr>
-              <a:t>(typ:TimerType, timerStruct:TimerStruct) =</a:t>
-            </a:r>
-          </a:p>
-          <a:p>
-            <a:endParaRPr lang="ko-KR" altLang="en-US" sz="1800" dirty="0">
-              <a:solidFill>
-                <a:srgbClr val="000000"/>
-              </a:solidFill>
-              <a:latin typeface="Cascadia Mono" panose="020B0609020000020004" pitchFamily="49" charset="0"/>
-            </a:endParaRPr>
-          </a:p>
-          <a:p>
-            <a:r>
-              <a:rPr lang="en-US" altLang="ko-KR" sz="1800" dirty="0">
-                <a:solidFill>
-                  <a:srgbClr val="000000"/>
-                </a:solidFill>
-                <a:latin typeface="Cascadia Mono" panose="020B0609020000020004" pitchFamily="49" charset="0"/>
-              </a:rPr>
-              <a:t>    </a:t>
-            </a:r>
-            <a:r>
-              <a:rPr lang="en-US" altLang="ko-KR" sz="1800" dirty="0">
-                <a:solidFill>
-                  <a:srgbClr val="0000FF"/>
-                </a:solidFill>
-                <a:latin typeface="Cascadia Mono" panose="020B0609020000020004" pitchFamily="49" charset="0"/>
-              </a:rPr>
-              <a:t>let</a:t>
-            </a:r>
-            <a:r>
-              <a:rPr lang="en-US" altLang="ko-KR" sz="1800" dirty="0">
-                <a:solidFill>
-                  <a:srgbClr val="000000"/>
-                </a:solidFill>
-                <a:latin typeface="Cascadia Mono" panose="020B0609020000020004" pitchFamily="49" charset="0"/>
-              </a:rPr>
-              <a:t> accumulator = </a:t>
-            </a:r>
-            <a:r>
-              <a:rPr lang="en-US" altLang="ko-KR" sz="1800" dirty="0">
-                <a:solidFill>
-                  <a:srgbClr val="0000FF"/>
-                </a:solidFill>
-                <a:latin typeface="Cascadia Mono" panose="020B0609020000020004" pitchFamily="49" charset="0"/>
-              </a:rPr>
-              <a:t>new</a:t>
-            </a:r>
-            <a:r>
-              <a:rPr lang="en-US" altLang="ko-KR" sz="1800" dirty="0">
-                <a:solidFill>
-                  <a:srgbClr val="000000"/>
-                </a:solidFill>
-                <a:latin typeface="Cascadia Mono" panose="020B0609020000020004" pitchFamily="49" charset="0"/>
-              </a:rPr>
-              <a:t> TickAccumulator(typ, timerStruct)</a:t>
-            </a:r>
-          </a:p>
-          <a:p>
-            <a:endParaRPr lang="ko-KR" altLang="en-US" sz="1800" dirty="0">
-              <a:solidFill>
-                <a:srgbClr val="000000"/>
-              </a:solidFill>
-              <a:latin typeface="Cascadia Mono" panose="020B0609020000020004" pitchFamily="49" charset="0"/>
-            </a:endParaRPr>
-          </a:p>
-          <a:p>
-            <a:r>
-              <a:rPr lang="en-US" altLang="ko-KR" sz="1800" dirty="0">
-                <a:solidFill>
-                  <a:srgbClr val="000000"/>
-                </a:solidFill>
-                <a:latin typeface="Cascadia Mono" panose="020B0609020000020004" pitchFamily="49" charset="0"/>
-              </a:rPr>
-              <a:t>    </a:t>
-            </a:r>
-            <a:r>
-              <a:rPr lang="en-US" altLang="ko-KR" sz="1800" dirty="0">
-                <a:solidFill>
-                  <a:srgbClr val="0000FF"/>
-                </a:solidFill>
-                <a:latin typeface="Cascadia Mono" panose="020B0609020000020004" pitchFamily="49" charset="0"/>
-              </a:rPr>
-              <a:t>member</a:t>
-            </a:r>
-            <a:r>
-              <a:rPr lang="en-US" altLang="ko-KR" sz="1800" dirty="0">
-                <a:solidFill>
-                  <a:srgbClr val="000000"/>
-                </a:solidFill>
-                <a:latin typeface="Cascadia Mono" panose="020B0609020000020004" pitchFamily="49" charset="0"/>
-              </a:rPr>
-              <a:t> _.Type = typ</a:t>
-            </a:r>
-          </a:p>
-          <a:p>
-            <a:r>
-              <a:rPr lang="en-US" altLang="ko-KR" sz="1800" dirty="0">
-                <a:solidFill>
-                  <a:srgbClr val="000000"/>
-                </a:solidFill>
-                <a:latin typeface="Cascadia Mono" panose="020B0609020000020004" pitchFamily="49" charset="0"/>
-              </a:rPr>
-              <a:t>    </a:t>
-            </a:r>
-            <a:r>
-              <a:rPr lang="en-US" altLang="ko-KR" sz="1800" dirty="0">
-                <a:solidFill>
-                  <a:srgbClr val="0000FF"/>
-                </a:solidFill>
-                <a:latin typeface="Cascadia Mono" panose="020B0609020000020004" pitchFamily="49" charset="0"/>
-              </a:rPr>
-              <a:t>member</a:t>
-            </a:r>
-            <a:r>
-              <a:rPr lang="en-US" altLang="ko-KR" sz="1800" dirty="0">
-                <a:solidFill>
-                  <a:srgbClr val="000000"/>
-                </a:solidFill>
-                <a:latin typeface="Cascadia Mono" panose="020B0609020000020004" pitchFamily="49" charset="0"/>
-              </a:rPr>
-              <a:t> _.Name = timerStruct.Name</a:t>
-            </a:r>
-          </a:p>
-          <a:p>
-            <a:r>
-              <a:rPr lang="en-US" altLang="ko-KR" sz="1800" dirty="0">
-                <a:solidFill>
-                  <a:srgbClr val="000000"/>
-                </a:solidFill>
-                <a:latin typeface="Cascadia Mono" panose="020B0609020000020004" pitchFamily="49" charset="0"/>
-              </a:rPr>
-              <a:t>    </a:t>
-            </a:r>
-            <a:r>
-              <a:rPr lang="en-US" altLang="ko-KR" sz="1800" dirty="0">
-                <a:solidFill>
-                  <a:srgbClr val="0000FF"/>
-                </a:solidFill>
-                <a:latin typeface="Cascadia Mono" panose="020B0609020000020004" pitchFamily="49" charset="0"/>
-              </a:rPr>
-              <a:t>member</a:t>
-            </a:r>
-            <a:r>
-              <a:rPr lang="en-US" altLang="ko-KR" sz="1800" dirty="0">
-                <a:solidFill>
-                  <a:srgbClr val="000000"/>
-                </a:solidFill>
-                <a:latin typeface="Cascadia Mono" panose="020B0609020000020004" pitchFamily="49" charset="0"/>
-              </a:rPr>
-              <a:t> _.EN = timerStruct.EN</a:t>
-            </a:r>
-          </a:p>
-          <a:p>
-            <a:r>
-              <a:rPr lang="en-US" altLang="ko-KR" sz="1800" dirty="0">
-                <a:solidFill>
-                  <a:srgbClr val="000000"/>
-                </a:solidFill>
-                <a:latin typeface="Cascadia Mono" panose="020B0609020000020004" pitchFamily="49" charset="0"/>
-              </a:rPr>
-              <a:t>    </a:t>
-            </a:r>
-            <a:r>
-              <a:rPr lang="en-US" altLang="ko-KR" sz="1800" dirty="0">
-                <a:solidFill>
-                  <a:srgbClr val="0000FF"/>
-                </a:solidFill>
-                <a:latin typeface="Cascadia Mono" panose="020B0609020000020004" pitchFamily="49" charset="0"/>
-              </a:rPr>
-              <a:t>member</a:t>
-            </a:r>
-            <a:r>
-              <a:rPr lang="en-US" altLang="ko-KR" sz="1800" dirty="0">
-                <a:solidFill>
-                  <a:srgbClr val="000000"/>
-                </a:solidFill>
-                <a:latin typeface="Cascadia Mono" panose="020B0609020000020004" pitchFamily="49" charset="0"/>
-              </a:rPr>
-              <a:t> _.TT = timerStruct.TT</a:t>
-            </a:r>
-          </a:p>
-          <a:p>
-            <a:r>
-              <a:rPr lang="en-US" altLang="ko-KR" sz="1800" dirty="0">
-                <a:solidFill>
-                  <a:srgbClr val="000000"/>
-                </a:solidFill>
-                <a:latin typeface="Cascadia Mono" panose="020B0609020000020004" pitchFamily="49" charset="0"/>
-              </a:rPr>
-              <a:t>    </a:t>
-            </a:r>
-            <a:r>
-              <a:rPr lang="en-US" altLang="ko-KR" sz="1800" dirty="0">
-                <a:solidFill>
-                  <a:srgbClr val="0000FF"/>
-                </a:solidFill>
-                <a:latin typeface="Cascadia Mono" panose="020B0609020000020004" pitchFamily="49" charset="0"/>
-              </a:rPr>
-              <a:t>member</a:t>
-            </a:r>
-            <a:r>
-              <a:rPr lang="en-US" altLang="ko-KR" sz="1800" dirty="0">
-                <a:solidFill>
-                  <a:srgbClr val="000000"/>
-                </a:solidFill>
-                <a:latin typeface="Cascadia Mono" panose="020B0609020000020004" pitchFamily="49" charset="0"/>
-              </a:rPr>
-              <a:t> _.DN = timerStruct.DN</a:t>
-            </a:r>
-          </a:p>
-          <a:p>
-            <a:r>
-              <a:rPr lang="en-US" altLang="ko-KR" sz="1800" dirty="0">
-                <a:solidFill>
-                  <a:srgbClr val="000000"/>
-                </a:solidFill>
-                <a:latin typeface="Cascadia Mono" panose="020B0609020000020004" pitchFamily="49" charset="0"/>
-              </a:rPr>
-              <a:t>    </a:t>
-            </a:r>
-            <a:r>
-              <a:rPr lang="en-US" altLang="ko-KR" sz="1800" dirty="0">
-                <a:solidFill>
-                  <a:srgbClr val="0000FF"/>
-                </a:solidFill>
-                <a:latin typeface="Cascadia Mono" panose="020B0609020000020004" pitchFamily="49" charset="0"/>
-              </a:rPr>
-              <a:t>member</a:t>
-            </a:r>
-            <a:r>
-              <a:rPr lang="en-US" altLang="ko-KR" sz="1800" dirty="0">
-                <a:solidFill>
-                  <a:srgbClr val="000000"/>
-                </a:solidFill>
-                <a:latin typeface="Cascadia Mono" panose="020B0609020000020004" pitchFamily="49" charset="0"/>
-              </a:rPr>
-              <a:t> _.PRE = timerStruct.PRE</a:t>
-            </a:r>
-          </a:p>
-          <a:p>
-            <a:r>
-              <a:rPr lang="en-US" altLang="ko-KR" sz="1800" dirty="0">
-                <a:solidFill>
-                  <a:srgbClr val="000000"/>
-                </a:solidFill>
-                <a:latin typeface="Cascadia Mono" panose="020B0609020000020004" pitchFamily="49" charset="0"/>
-              </a:rPr>
-              <a:t>    </a:t>
-            </a:r>
-            <a:r>
-              <a:rPr lang="en-US" altLang="ko-KR" sz="1800" dirty="0">
-                <a:solidFill>
-                  <a:srgbClr val="0000FF"/>
-                </a:solidFill>
-                <a:latin typeface="Cascadia Mono" panose="020B0609020000020004" pitchFamily="49" charset="0"/>
-              </a:rPr>
-              <a:t>member</a:t>
-            </a:r>
-            <a:r>
-              <a:rPr lang="en-US" altLang="ko-KR" sz="1800" dirty="0">
-                <a:solidFill>
-                  <a:srgbClr val="000000"/>
-                </a:solidFill>
-                <a:latin typeface="Cascadia Mono" panose="020B0609020000020004" pitchFamily="49" charset="0"/>
-              </a:rPr>
-              <a:t> _.ACC = timerStruct.ACC</a:t>
-            </a:r>
-          </a:p>
-          <a:p>
-            <a:r>
-              <a:rPr lang="en-US" altLang="ko-KR" sz="1800" dirty="0">
-                <a:solidFill>
-                  <a:srgbClr val="000000"/>
-                </a:solidFill>
-                <a:latin typeface="Cascadia Mono" panose="020B0609020000020004" pitchFamily="49" charset="0"/>
-              </a:rPr>
-              <a:t>    </a:t>
-            </a:r>
-            <a:r>
-              <a:rPr lang="en-US" altLang="ko-KR" sz="1800" dirty="0">
-                <a:solidFill>
-                  <a:srgbClr val="0000FF"/>
-                </a:solidFill>
-                <a:latin typeface="Cascadia Mono" panose="020B0609020000020004" pitchFamily="49" charset="0"/>
-              </a:rPr>
-              <a:t>member</a:t>
-            </a:r>
-            <a:r>
-              <a:rPr lang="en-US" altLang="ko-KR" sz="1800" dirty="0">
-                <a:solidFill>
-                  <a:srgbClr val="000000"/>
-                </a:solidFill>
-                <a:latin typeface="Cascadia Mono" panose="020B0609020000020004" pitchFamily="49" charset="0"/>
-              </a:rPr>
-              <a:t> _.RES = timerStruct.RES</a:t>
-            </a:r>
-          </a:p>
-          <a:p>
-            <a:endParaRPr lang="ko-KR" altLang="en-US" sz="1800" dirty="0">
-              <a:solidFill>
-                <a:srgbClr val="000000"/>
-              </a:solidFill>
-              <a:latin typeface="Cascadia Mono" panose="020B0609020000020004" pitchFamily="49" charset="0"/>
-            </a:endParaRPr>
-          </a:p>
-          <a:p>
-            <a:r>
-              <a:rPr lang="en-US" altLang="ko-KR" sz="1800" dirty="0">
-                <a:solidFill>
-                  <a:srgbClr val="000000"/>
-                </a:solidFill>
-                <a:latin typeface="Cascadia Mono" panose="020B0609020000020004" pitchFamily="49" charset="0"/>
-              </a:rPr>
-              <a:t>    </a:t>
-            </a:r>
-            <a:r>
-              <a:rPr lang="en-US" altLang="ko-KR" sz="1800" dirty="0">
-                <a:solidFill>
-                  <a:srgbClr val="0000FF"/>
-                </a:solidFill>
-                <a:latin typeface="Cascadia Mono" panose="020B0609020000020004" pitchFamily="49" charset="0"/>
-              </a:rPr>
-              <a:t>member</a:t>
-            </a:r>
-            <a:r>
-              <a:rPr lang="en-US" altLang="ko-KR" sz="1800" dirty="0">
-                <a:solidFill>
-                  <a:srgbClr val="000000"/>
-                </a:solidFill>
-                <a:latin typeface="Cascadia Mono" panose="020B0609020000020004" pitchFamily="49" charset="0"/>
-              </a:rPr>
-              <a:t> </a:t>
-            </a:r>
-            <a:r>
-              <a:rPr lang="en-US" altLang="ko-KR" sz="1800" dirty="0">
-                <a:solidFill>
-                  <a:srgbClr val="0000FF"/>
-                </a:solidFill>
-                <a:latin typeface="Cascadia Mono" panose="020B0609020000020004" pitchFamily="49" charset="0"/>
-              </a:rPr>
-              <a:t>val</a:t>
-            </a:r>
-            <a:r>
-              <a:rPr lang="en-US" altLang="ko-KR" sz="1800" dirty="0">
-                <a:solidFill>
-                  <a:srgbClr val="000000"/>
-                </a:solidFill>
-                <a:latin typeface="Cascadia Mono" panose="020B0609020000020004" pitchFamily="49" charset="0"/>
-              </a:rPr>
-              <a:t> </a:t>
-            </a:r>
-            <a:r>
-              <a:rPr lang="en-US" altLang="ko-KR" sz="1800" dirty="0">
-                <a:solidFill>
-                  <a:srgbClr val="0070C0"/>
-                </a:solidFill>
-                <a:latin typeface="Cascadia Mono" panose="020B0609020000020004" pitchFamily="49" charset="0"/>
-              </a:rPr>
-              <a:t>InputEvaluateStatements</a:t>
-            </a:r>
-            <a:r>
-              <a:rPr lang="en-US" altLang="ko-KR" sz="1800" dirty="0">
-                <a:solidFill>
-                  <a:srgbClr val="000000"/>
-                </a:solidFill>
-                <a:latin typeface="Cascadia Mono" panose="020B0609020000020004" pitchFamily="49" charset="0"/>
-              </a:rPr>
-              <a:t>:</a:t>
-            </a:r>
-            <a:r>
-              <a:rPr lang="en-US" altLang="ko-KR" sz="1800" dirty="0">
-                <a:solidFill>
-                  <a:srgbClr val="FF0000"/>
-                </a:solidFill>
-                <a:latin typeface="Cascadia Mono" panose="020B0609020000020004" pitchFamily="49" charset="0"/>
-              </a:rPr>
-              <a:t>Statement list </a:t>
-            </a:r>
-            <a:r>
-              <a:rPr lang="en-US" altLang="ko-KR" sz="1800" dirty="0">
-                <a:solidFill>
-                  <a:srgbClr val="000000"/>
-                </a:solidFill>
-                <a:latin typeface="Cascadia Mono" panose="020B0609020000020004" pitchFamily="49" charset="0"/>
-              </a:rPr>
-              <a:t>= [] </a:t>
-            </a:r>
-            <a:r>
-              <a:rPr lang="en-US" altLang="ko-KR" sz="1800" dirty="0">
-                <a:solidFill>
-                  <a:srgbClr val="0000FF"/>
-                </a:solidFill>
-                <a:latin typeface="Cascadia Mono" panose="020B0609020000020004" pitchFamily="49" charset="0"/>
-              </a:rPr>
-              <a:t>with</a:t>
-            </a:r>
-            <a:r>
-              <a:rPr lang="en-US" altLang="ko-KR" sz="1800" dirty="0">
-                <a:solidFill>
-                  <a:srgbClr val="000000"/>
-                </a:solidFill>
-                <a:latin typeface="Cascadia Mono" panose="020B0609020000020004" pitchFamily="49" charset="0"/>
-              </a:rPr>
-              <a:t> get, set</a:t>
-            </a:r>
-          </a:p>
-          <a:p>
-            <a:r>
-              <a:rPr lang="en-US" altLang="ko-KR" sz="1800" dirty="0">
-                <a:solidFill>
-                  <a:srgbClr val="000000"/>
-                </a:solidFill>
-                <a:latin typeface="Cascadia Mono" panose="020B0609020000020004" pitchFamily="49" charset="0"/>
-              </a:rPr>
-              <a:t>    </a:t>
-            </a:r>
-            <a:r>
-              <a:rPr lang="en-US" altLang="ko-KR" sz="1800" dirty="0">
-                <a:solidFill>
-                  <a:srgbClr val="0000FF"/>
-                </a:solidFill>
-                <a:latin typeface="Cascadia Mono" panose="020B0609020000020004" pitchFamily="49" charset="0"/>
-              </a:rPr>
-              <a:t>interface</a:t>
-            </a:r>
-            <a:r>
-              <a:rPr lang="en-US" altLang="ko-KR" sz="1800" dirty="0">
-                <a:solidFill>
-                  <a:srgbClr val="000000"/>
-                </a:solidFill>
-                <a:latin typeface="Cascadia Mono" panose="020B0609020000020004" pitchFamily="49" charset="0"/>
-              </a:rPr>
-              <a:t> IDisposable </a:t>
-            </a:r>
-            <a:r>
-              <a:rPr lang="en-US" altLang="ko-KR" sz="1800" dirty="0">
-                <a:solidFill>
-                  <a:srgbClr val="0000FF"/>
-                </a:solidFill>
-                <a:latin typeface="Cascadia Mono" panose="020B0609020000020004" pitchFamily="49" charset="0"/>
-              </a:rPr>
-              <a:t>with</a:t>
-            </a:r>
-            <a:endParaRPr lang="en-US" altLang="ko-KR" sz="1800" dirty="0">
-              <a:solidFill>
-                <a:srgbClr val="000000"/>
-              </a:solidFill>
-              <a:latin typeface="Cascadia Mono" panose="020B0609020000020004" pitchFamily="49" charset="0"/>
-            </a:endParaRPr>
-          </a:p>
-          <a:p>
-            <a:r>
-              <a:rPr lang="en-US" altLang="ko-KR" sz="1800" dirty="0">
-                <a:solidFill>
-                  <a:srgbClr val="000000"/>
-                </a:solidFill>
-                <a:latin typeface="Cascadia Mono" panose="020B0609020000020004" pitchFamily="49" charset="0"/>
-              </a:rPr>
-              <a:t>        </a:t>
-            </a:r>
-            <a:r>
-              <a:rPr lang="en-US" altLang="ko-KR" sz="1800" dirty="0">
-                <a:solidFill>
-                  <a:srgbClr val="0000FF"/>
-                </a:solidFill>
-                <a:latin typeface="Cascadia Mono" panose="020B0609020000020004" pitchFamily="49" charset="0"/>
-              </a:rPr>
-              <a:t>member</a:t>
-            </a:r>
-            <a:r>
-              <a:rPr lang="en-US" altLang="ko-KR" sz="1800" dirty="0">
-                <a:solidFill>
-                  <a:srgbClr val="000000"/>
-                </a:solidFill>
-                <a:latin typeface="Cascadia Mono" panose="020B0609020000020004" pitchFamily="49" charset="0"/>
-              </a:rPr>
-              <a:t> _.Dispose() = (accumulator :&gt; IDisposable).Dispose()</a:t>
-            </a:r>
-          </a:p>
-        </p:txBody>
-      </p:sp>
-    </p:spTree>
-    <p:extLst>
-      <p:ext uri="{BB962C8B-B14F-4D97-AF65-F5344CB8AC3E}">
-        <p14:creationId xmlns:p14="http://schemas.microsoft.com/office/powerpoint/2010/main" val="3718364714"/>
-      </p:ext>
-    </p:extLst>
-  </p:cSld>
-  <p:clrMapOvr>
-    <a:masterClrMapping/>
-  </p:clrMapOvr>
-</p:sld>
-</file>
-
 <file path=ppt/slides/slide13.xml><?xml version="1.0" encoding="utf-8"?>
 <p:sld xmlns:a="http://schemas.openxmlformats.org/drawingml/2006/main" xmlns:r="http://schemas.openxmlformats.org/officeDocument/2006/relationships" xmlns:p="http://schemas.openxmlformats.org/presentationml/2006/main">
   <p:cSld>
@@ -5401,6 +4608,997 @@
           <p:cNvPr id="2" name="제목 1">
             <a:extLst>
               <a:ext uri="{FF2B5EF4-FFF2-40B4-BE49-F238E27FC236}">
+                <a16:creationId xmlns:a16="http://schemas.microsoft.com/office/drawing/2014/main" id="{1B5AB5BE-0CEB-62D1-287B-7A8FB8BC868A}"/>
+              </a:ext>
+            </a:extLst>
+          </p:cNvPr>
+          <p:cNvSpPr>
+            <a:spLocks noGrp="1"/>
+          </p:cNvSpPr>
+          <p:nvPr>
+            <p:ph type="title"/>
+          </p:nvPr>
+        </p:nvSpPr>
+        <p:spPr/>
+        <p:txBody>
+          <a:bodyPr/>
+          <a:lstStyle/>
+          <a:p>
+            <a:r>
+              <a:rPr lang="en-US" altLang="ko-KR" dirty="0"/>
+              <a:t>Classes : Timer/Counter top level</a:t>
+            </a:r>
+            <a:endParaRPr lang="ko-KR" altLang="en-US" dirty="0"/>
+          </a:p>
+        </p:txBody>
+      </p:sp>
+      <p:sp>
+        <p:nvSpPr>
+          <p:cNvPr id="5" name="TextBox 4">
+            <a:extLst>
+              <a:ext uri="{FF2B5EF4-FFF2-40B4-BE49-F238E27FC236}">
+                <a16:creationId xmlns:a16="http://schemas.microsoft.com/office/drawing/2014/main" id="{97A82AB5-B6A3-7DF3-7F5D-F0EAA673A0E9}"/>
+              </a:ext>
+            </a:extLst>
+          </p:cNvPr>
+          <p:cNvSpPr txBox="1"/>
+          <p:nvPr/>
+        </p:nvSpPr>
+        <p:spPr>
+          <a:xfrm>
+            <a:off x="951344" y="1889174"/>
+            <a:ext cx="9938329" cy="3970318"/>
+          </a:xfrm>
+          <a:prstGeom prst="rect">
+            <a:avLst/>
+          </a:prstGeom>
+          <a:noFill/>
+        </p:spPr>
+        <p:txBody>
+          <a:bodyPr wrap="square">
+            <a:spAutoFit/>
+          </a:bodyPr>
+          <a:lstStyle/>
+          <a:p>
+            <a:r>
+              <a:rPr lang="en-US" altLang="ko-KR" sz="1400" dirty="0">
+                <a:solidFill>
+                  <a:srgbClr val="0000FF"/>
+                </a:solidFill>
+                <a:latin typeface="Cascadia Mono" panose="020B0609020000020004" pitchFamily="49" charset="0"/>
+              </a:rPr>
+              <a:t>type</a:t>
+            </a:r>
+            <a:r>
+              <a:rPr lang="en-US" altLang="ko-KR" sz="1400" dirty="0">
+                <a:solidFill>
+                  <a:srgbClr val="000000"/>
+                </a:solidFill>
+                <a:latin typeface="Cascadia Mono" panose="020B0609020000020004" pitchFamily="49" charset="0"/>
+              </a:rPr>
+              <a:t> Statement =</a:t>
+            </a:r>
+          </a:p>
+          <a:p>
+            <a:r>
+              <a:rPr lang="en-US" altLang="ko-KR" sz="1400" dirty="0">
+                <a:solidFill>
+                  <a:srgbClr val="000000"/>
+                </a:solidFill>
+                <a:latin typeface="Cascadia Mono" panose="020B0609020000020004" pitchFamily="49" charset="0"/>
+              </a:rPr>
+              <a:t>        | DuAssign </a:t>
+            </a:r>
+            <a:r>
+              <a:rPr lang="en-US" altLang="ko-KR" sz="1400" dirty="0">
+                <a:solidFill>
+                  <a:srgbClr val="0000FF"/>
+                </a:solidFill>
+                <a:latin typeface="Cascadia Mono" panose="020B0609020000020004" pitchFamily="49" charset="0"/>
+              </a:rPr>
+              <a:t>of</a:t>
+            </a:r>
+            <a:r>
+              <a:rPr lang="en-US" altLang="ko-KR" sz="1400" dirty="0">
+                <a:solidFill>
+                  <a:srgbClr val="000000"/>
+                </a:solidFill>
+                <a:latin typeface="Cascadia Mono" panose="020B0609020000020004" pitchFamily="49" charset="0"/>
+              </a:rPr>
+              <a:t> expression:IExpression * target:IStorage</a:t>
+            </a:r>
+          </a:p>
+          <a:p>
+            <a:r>
+              <a:rPr lang="en-US" altLang="ko-KR" sz="1400" dirty="0">
+                <a:solidFill>
+                  <a:srgbClr val="000000"/>
+                </a:solidFill>
+                <a:latin typeface="Cascadia Mono" panose="020B0609020000020004" pitchFamily="49" charset="0"/>
+              </a:rPr>
+              <a:t>        | DuVarDecl </a:t>
+            </a:r>
+            <a:r>
+              <a:rPr lang="en-US" altLang="ko-KR" sz="1400" dirty="0">
+                <a:solidFill>
+                  <a:srgbClr val="0000FF"/>
+                </a:solidFill>
+                <a:latin typeface="Cascadia Mono" panose="020B0609020000020004" pitchFamily="49" charset="0"/>
+              </a:rPr>
+              <a:t>of</a:t>
+            </a:r>
+            <a:r>
+              <a:rPr lang="en-US" altLang="ko-KR" sz="1400" dirty="0">
+                <a:solidFill>
+                  <a:srgbClr val="000000"/>
+                </a:solidFill>
+                <a:latin typeface="Cascadia Mono" panose="020B0609020000020004" pitchFamily="49" charset="0"/>
+              </a:rPr>
+              <a:t> expression:IExpression * variable:IStorage</a:t>
+            </a:r>
+          </a:p>
+          <a:p>
+            <a:r>
+              <a:rPr lang="en-US" altLang="ko-KR" sz="1400" dirty="0">
+                <a:solidFill>
+                  <a:srgbClr val="000000"/>
+                </a:solidFill>
+                <a:latin typeface="Cascadia Mono" panose="020B0609020000020004" pitchFamily="49" charset="0"/>
+              </a:rPr>
+              <a:t>        | DuTimer </a:t>
+            </a:r>
+            <a:r>
+              <a:rPr lang="en-US" altLang="ko-KR" sz="1400" dirty="0">
+                <a:solidFill>
+                  <a:srgbClr val="0000FF"/>
+                </a:solidFill>
+                <a:latin typeface="Cascadia Mono" panose="020B0609020000020004" pitchFamily="49" charset="0"/>
+              </a:rPr>
+              <a:t>of</a:t>
+            </a:r>
+            <a:r>
+              <a:rPr lang="en-US" altLang="ko-KR" sz="1400" dirty="0">
+                <a:solidFill>
+                  <a:srgbClr val="000000"/>
+                </a:solidFill>
+                <a:latin typeface="Cascadia Mono" panose="020B0609020000020004" pitchFamily="49" charset="0"/>
+              </a:rPr>
+              <a:t> TimerStatement</a:t>
+            </a:r>
+          </a:p>
+          <a:p>
+            <a:r>
+              <a:rPr lang="en-US" altLang="ko-KR" sz="1400" dirty="0">
+                <a:solidFill>
+                  <a:srgbClr val="000000"/>
+                </a:solidFill>
+                <a:latin typeface="Cascadia Mono" panose="020B0609020000020004" pitchFamily="49" charset="0"/>
+              </a:rPr>
+              <a:t>        | DuCounter </a:t>
+            </a:r>
+            <a:r>
+              <a:rPr lang="en-US" altLang="ko-KR" sz="1400" dirty="0">
+                <a:solidFill>
+                  <a:srgbClr val="0000FF"/>
+                </a:solidFill>
+                <a:latin typeface="Cascadia Mono" panose="020B0609020000020004" pitchFamily="49" charset="0"/>
+              </a:rPr>
+              <a:t>of</a:t>
+            </a:r>
+            <a:r>
+              <a:rPr lang="en-US" altLang="ko-KR" sz="1400" dirty="0">
+                <a:solidFill>
+                  <a:srgbClr val="000000"/>
+                </a:solidFill>
+                <a:latin typeface="Cascadia Mono" panose="020B0609020000020004" pitchFamily="49" charset="0"/>
+              </a:rPr>
+              <a:t> CounterStatement</a:t>
+            </a:r>
+          </a:p>
+          <a:p>
+            <a:endParaRPr lang="en-US" altLang="ko-KR" sz="1400" dirty="0">
+              <a:solidFill>
+                <a:srgbClr val="000000"/>
+              </a:solidFill>
+              <a:latin typeface="Cascadia Mono" panose="020B0609020000020004" pitchFamily="49" charset="0"/>
+            </a:endParaRPr>
+          </a:p>
+          <a:p>
+            <a:r>
+              <a:rPr lang="en-US" altLang="ko-KR" sz="1400" dirty="0">
+                <a:solidFill>
+                  <a:srgbClr val="0000FF"/>
+                </a:solidFill>
+                <a:latin typeface="Cascadia Mono" panose="020B0609020000020004" pitchFamily="49" charset="0"/>
+              </a:rPr>
+              <a:t>type</a:t>
+            </a:r>
+            <a:r>
+              <a:rPr lang="en-US" altLang="ko-KR" sz="1400" dirty="0">
+                <a:solidFill>
+                  <a:srgbClr val="000000"/>
+                </a:solidFill>
+                <a:latin typeface="Cascadia Mono" panose="020B0609020000020004" pitchFamily="49" charset="0"/>
+              </a:rPr>
+              <a:t> TimerStatement = {</a:t>
+            </a:r>
+          </a:p>
+          <a:p>
+            <a:r>
+              <a:rPr lang="en-US" altLang="ko-KR" sz="1400" dirty="0">
+                <a:solidFill>
+                  <a:srgbClr val="000000"/>
+                </a:solidFill>
+                <a:latin typeface="Cascadia Mono" panose="020B0609020000020004" pitchFamily="49" charset="0"/>
+              </a:rPr>
+              <a:t>    Timer:</a:t>
+            </a:r>
+            <a:r>
+              <a:rPr lang="en-US" altLang="ko-KR" sz="1400" dirty="0">
+                <a:solidFill>
+                  <a:srgbClr val="FF0000"/>
+                </a:solidFill>
+                <a:latin typeface="Cascadia Mono" panose="020B0609020000020004" pitchFamily="49" charset="0"/>
+              </a:rPr>
+              <a:t>Timer</a:t>
+            </a:r>
+          </a:p>
+          <a:p>
+            <a:r>
+              <a:rPr lang="en-US" altLang="ko-KR" sz="1400" dirty="0">
+                <a:solidFill>
+                  <a:srgbClr val="000000"/>
+                </a:solidFill>
+                <a:latin typeface="Cascadia Mono" panose="020B0609020000020004" pitchFamily="49" charset="0"/>
+              </a:rPr>
+              <a:t>    RungInCondition: IExpression&lt;bool&gt; option</a:t>
+            </a:r>
+          </a:p>
+          <a:p>
+            <a:r>
+              <a:rPr lang="en-US" altLang="ko-KR" sz="1400" dirty="0">
+                <a:solidFill>
+                  <a:srgbClr val="000000"/>
+                </a:solidFill>
+                <a:latin typeface="Cascadia Mono" panose="020B0609020000020004" pitchFamily="49" charset="0"/>
+              </a:rPr>
+              <a:t>    ResetCondition:  IExpression&lt;bool&gt; option</a:t>
+            </a:r>
+          </a:p>
+          <a:p>
+            <a:r>
+              <a:rPr lang="en-US" altLang="ko-KR" sz="1400" dirty="0">
+                <a:solidFill>
+                  <a:srgbClr val="000000"/>
+                </a:solidFill>
+                <a:latin typeface="Cascadia Mono" panose="020B0609020000020004" pitchFamily="49" charset="0"/>
+              </a:rPr>
+              <a:t>}</a:t>
+            </a:r>
+          </a:p>
+          <a:p>
+            <a:endParaRPr lang="ko-KR" altLang="en-US" sz="1400" dirty="0">
+              <a:solidFill>
+                <a:srgbClr val="000000"/>
+              </a:solidFill>
+              <a:latin typeface="Cascadia Mono" panose="020B0609020000020004" pitchFamily="49" charset="0"/>
+            </a:endParaRPr>
+          </a:p>
+          <a:p>
+            <a:r>
+              <a:rPr lang="en-US" altLang="ko-KR" sz="1400" dirty="0">
+                <a:solidFill>
+                  <a:srgbClr val="0000FF"/>
+                </a:solidFill>
+                <a:latin typeface="Cascadia Mono" panose="020B0609020000020004" pitchFamily="49" charset="0"/>
+              </a:rPr>
+              <a:t>type</a:t>
+            </a:r>
+            <a:r>
+              <a:rPr lang="en-US" altLang="ko-KR" sz="1400" dirty="0">
+                <a:solidFill>
+                  <a:srgbClr val="000000"/>
+                </a:solidFill>
+                <a:latin typeface="Cascadia Mono" panose="020B0609020000020004" pitchFamily="49" charset="0"/>
+              </a:rPr>
+              <a:t> CounterStatement = {</a:t>
+            </a:r>
+          </a:p>
+          <a:p>
+            <a:r>
+              <a:rPr lang="en-US" altLang="ko-KR" sz="1400" dirty="0">
+                <a:solidFill>
+                  <a:srgbClr val="000000"/>
+                </a:solidFill>
+                <a:latin typeface="Cascadia Mono" panose="020B0609020000020004" pitchFamily="49" charset="0"/>
+              </a:rPr>
+              <a:t>    Counter:Counter</a:t>
+            </a:r>
+          </a:p>
+          <a:p>
+            <a:r>
+              <a:rPr lang="en-US" altLang="ko-KR" sz="1400" dirty="0">
+                <a:solidFill>
+                  <a:srgbClr val="000000"/>
+                </a:solidFill>
+                <a:latin typeface="Cascadia Mono" panose="020B0609020000020004" pitchFamily="49" charset="0"/>
+              </a:rPr>
+              <a:t>    UpCondition: IExpression&lt;bool&gt; option</a:t>
+            </a:r>
+          </a:p>
+          <a:p>
+            <a:r>
+              <a:rPr lang="en-US" altLang="ko-KR" sz="1400" dirty="0">
+                <a:solidFill>
+                  <a:srgbClr val="000000"/>
+                </a:solidFill>
+                <a:latin typeface="Cascadia Mono" panose="020B0609020000020004" pitchFamily="49" charset="0"/>
+              </a:rPr>
+              <a:t>    DownCondition: IExpression&lt;bool&gt; option</a:t>
+            </a:r>
+          </a:p>
+          <a:p>
+            <a:r>
+              <a:rPr lang="en-US" altLang="ko-KR" sz="1400" dirty="0">
+                <a:solidFill>
+                  <a:srgbClr val="000000"/>
+                </a:solidFill>
+                <a:latin typeface="Cascadia Mono" panose="020B0609020000020004" pitchFamily="49" charset="0"/>
+              </a:rPr>
+              <a:t>    ResetCondition:  IExpression&lt;bool&gt; option</a:t>
+            </a:r>
+          </a:p>
+          <a:p>
+            <a:r>
+              <a:rPr lang="en-US" altLang="ko-KR" sz="1400" dirty="0">
+                <a:solidFill>
+                  <a:srgbClr val="000000"/>
+                </a:solidFill>
+                <a:latin typeface="Cascadia Mono" panose="020B0609020000020004" pitchFamily="49" charset="0"/>
+              </a:rPr>
+              <a:t>}</a:t>
+            </a:r>
+          </a:p>
+        </p:txBody>
+      </p:sp>
+    </p:spTree>
+    <p:extLst>
+      <p:ext uri="{BB962C8B-B14F-4D97-AF65-F5344CB8AC3E}">
+        <p14:creationId xmlns:p14="http://schemas.microsoft.com/office/powerpoint/2010/main" val="3044527727"/>
+      </p:ext>
+    </p:extLst>
+  </p:cSld>
+  <p:clrMapOvr>
+    <a:masterClrMapping/>
+  </p:clrMapOvr>
+</p:sld>
+</file>
+
+<file path=ppt/slides/slide14.xml><?xml version="1.0" encoding="utf-8"?>
+<p:sld xmlns:a="http://schemas.openxmlformats.org/drawingml/2006/main" xmlns:r="http://schemas.openxmlformats.org/officeDocument/2006/relationships" xmlns:p="http://schemas.openxmlformats.org/presentationml/2006/main">
+  <p:cSld>
+    <p:spTree>
+      <p:nvGrpSpPr>
+        <p:cNvPr id="1" name=""/>
+        <p:cNvGrpSpPr/>
+        <p:nvPr/>
+      </p:nvGrpSpPr>
+      <p:grpSpPr>
+        <a:xfrm>
+          <a:off x="0" y="0"/>
+          <a:ext cx="0" cy="0"/>
+          <a:chOff x="0" y="0"/>
+          <a:chExt cx="0" cy="0"/>
+        </a:xfrm>
+      </p:grpSpPr>
+      <p:sp>
+        <p:nvSpPr>
+          <p:cNvPr id="2" name="제목 1">
+            <a:extLst>
+              <a:ext uri="{FF2B5EF4-FFF2-40B4-BE49-F238E27FC236}">
+                <a16:creationId xmlns:a16="http://schemas.microsoft.com/office/drawing/2014/main" id="{5EB18DC9-FC2F-0591-7F29-6E1E653363F3}"/>
+              </a:ext>
+            </a:extLst>
+          </p:cNvPr>
+          <p:cNvSpPr>
+            <a:spLocks noGrp="1"/>
+          </p:cNvSpPr>
+          <p:nvPr>
+            <p:ph type="title"/>
+          </p:nvPr>
+        </p:nvSpPr>
+        <p:spPr/>
+        <p:txBody>
+          <a:bodyPr/>
+          <a:lstStyle/>
+          <a:p>
+            <a:r>
+              <a:rPr lang="en-US" altLang="ko-KR" dirty="0"/>
+              <a:t>Classes : Timer statements</a:t>
+            </a:r>
+            <a:endParaRPr lang="ko-KR" altLang="en-US" dirty="0"/>
+          </a:p>
+        </p:txBody>
+      </p:sp>
+      <p:sp>
+        <p:nvSpPr>
+          <p:cNvPr id="5" name="TextBox 4">
+            <a:extLst>
+              <a:ext uri="{FF2B5EF4-FFF2-40B4-BE49-F238E27FC236}">
+                <a16:creationId xmlns:a16="http://schemas.microsoft.com/office/drawing/2014/main" id="{8E9067D1-0ED2-925C-8C37-9111D6743EA1}"/>
+              </a:ext>
+            </a:extLst>
+          </p:cNvPr>
+          <p:cNvSpPr txBox="1"/>
+          <p:nvPr/>
+        </p:nvSpPr>
+        <p:spPr>
+          <a:xfrm>
+            <a:off x="838200" y="1880581"/>
+            <a:ext cx="10594109" cy="4524315"/>
+          </a:xfrm>
+          <a:prstGeom prst="rect">
+            <a:avLst/>
+          </a:prstGeom>
+          <a:noFill/>
+        </p:spPr>
+        <p:txBody>
+          <a:bodyPr wrap="square">
+            <a:spAutoFit/>
+          </a:bodyPr>
+          <a:lstStyle/>
+          <a:p>
+            <a:r>
+              <a:rPr lang="en-US" altLang="ko-KR" sz="1800" dirty="0">
+                <a:solidFill>
+                  <a:srgbClr val="0000FF"/>
+                </a:solidFill>
+                <a:latin typeface="Cascadia Mono" panose="020B0609020000020004" pitchFamily="49" charset="0"/>
+              </a:rPr>
+              <a:t>type</a:t>
+            </a:r>
+            <a:r>
+              <a:rPr lang="en-US" altLang="ko-KR" sz="1800" dirty="0">
+                <a:solidFill>
+                  <a:srgbClr val="000000"/>
+                </a:solidFill>
+                <a:latin typeface="Cascadia Mono" panose="020B0609020000020004" pitchFamily="49" charset="0"/>
+              </a:rPr>
+              <a:t> Timer </a:t>
+            </a:r>
+            <a:r>
+              <a:rPr lang="en-US" altLang="ko-KR" sz="1800" dirty="0">
+                <a:solidFill>
+                  <a:srgbClr val="0000FF"/>
+                </a:solidFill>
+                <a:latin typeface="Cascadia Mono" panose="020B0609020000020004" pitchFamily="49" charset="0"/>
+              </a:rPr>
+              <a:t>internal</a:t>
+            </a:r>
+            <a:r>
+              <a:rPr lang="en-US" altLang="ko-KR" sz="1800" dirty="0">
+                <a:solidFill>
+                  <a:srgbClr val="000000"/>
+                </a:solidFill>
+                <a:latin typeface="Cascadia Mono" panose="020B0609020000020004" pitchFamily="49" charset="0"/>
+              </a:rPr>
+              <a:t>(typ:TimerType, timerStruct:TimerStruct) =</a:t>
+            </a:r>
+          </a:p>
+          <a:p>
+            <a:endParaRPr lang="ko-KR" altLang="en-US" sz="1800" dirty="0">
+              <a:solidFill>
+                <a:srgbClr val="000000"/>
+              </a:solidFill>
+              <a:latin typeface="Cascadia Mono" panose="020B0609020000020004" pitchFamily="49" charset="0"/>
+            </a:endParaRPr>
+          </a:p>
+          <a:p>
+            <a:r>
+              <a:rPr lang="en-US" altLang="ko-KR" sz="1800" dirty="0">
+                <a:solidFill>
+                  <a:srgbClr val="000000"/>
+                </a:solidFill>
+                <a:latin typeface="Cascadia Mono" panose="020B0609020000020004" pitchFamily="49" charset="0"/>
+              </a:rPr>
+              <a:t>    </a:t>
+            </a:r>
+            <a:r>
+              <a:rPr lang="en-US" altLang="ko-KR" sz="1800" dirty="0">
+                <a:solidFill>
+                  <a:srgbClr val="0000FF"/>
+                </a:solidFill>
+                <a:latin typeface="Cascadia Mono" panose="020B0609020000020004" pitchFamily="49" charset="0"/>
+              </a:rPr>
+              <a:t>let</a:t>
+            </a:r>
+            <a:r>
+              <a:rPr lang="en-US" altLang="ko-KR" sz="1800" dirty="0">
+                <a:solidFill>
+                  <a:srgbClr val="000000"/>
+                </a:solidFill>
+                <a:latin typeface="Cascadia Mono" panose="020B0609020000020004" pitchFamily="49" charset="0"/>
+              </a:rPr>
+              <a:t> accumulator = </a:t>
+            </a:r>
+            <a:r>
+              <a:rPr lang="en-US" altLang="ko-KR" sz="1800" dirty="0">
+                <a:solidFill>
+                  <a:srgbClr val="0000FF"/>
+                </a:solidFill>
+                <a:latin typeface="Cascadia Mono" panose="020B0609020000020004" pitchFamily="49" charset="0"/>
+              </a:rPr>
+              <a:t>new</a:t>
+            </a:r>
+            <a:r>
+              <a:rPr lang="en-US" altLang="ko-KR" sz="1800" dirty="0">
+                <a:solidFill>
+                  <a:srgbClr val="000000"/>
+                </a:solidFill>
+                <a:latin typeface="Cascadia Mono" panose="020B0609020000020004" pitchFamily="49" charset="0"/>
+              </a:rPr>
+              <a:t> TickAccumulator(typ, timerStruct)</a:t>
+            </a:r>
+          </a:p>
+          <a:p>
+            <a:endParaRPr lang="ko-KR" altLang="en-US" sz="1800" dirty="0">
+              <a:solidFill>
+                <a:srgbClr val="000000"/>
+              </a:solidFill>
+              <a:latin typeface="Cascadia Mono" panose="020B0609020000020004" pitchFamily="49" charset="0"/>
+            </a:endParaRPr>
+          </a:p>
+          <a:p>
+            <a:r>
+              <a:rPr lang="en-US" altLang="ko-KR" sz="1800" dirty="0">
+                <a:solidFill>
+                  <a:srgbClr val="000000"/>
+                </a:solidFill>
+                <a:latin typeface="Cascadia Mono" panose="020B0609020000020004" pitchFamily="49" charset="0"/>
+              </a:rPr>
+              <a:t>    </a:t>
+            </a:r>
+            <a:r>
+              <a:rPr lang="en-US" altLang="ko-KR" sz="1800" dirty="0">
+                <a:solidFill>
+                  <a:srgbClr val="0000FF"/>
+                </a:solidFill>
+                <a:latin typeface="Cascadia Mono" panose="020B0609020000020004" pitchFamily="49" charset="0"/>
+              </a:rPr>
+              <a:t>member</a:t>
+            </a:r>
+            <a:r>
+              <a:rPr lang="en-US" altLang="ko-KR" sz="1800" dirty="0">
+                <a:solidFill>
+                  <a:srgbClr val="000000"/>
+                </a:solidFill>
+                <a:latin typeface="Cascadia Mono" panose="020B0609020000020004" pitchFamily="49" charset="0"/>
+              </a:rPr>
+              <a:t> _.Type = typ</a:t>
+            </a:r>
+          </a:p>
+          <a:p>
+            <a:r>
+              <a:rPr lang="en-US" altLang="ko-KR" sz="1800" dirty="0">
+                <a:solidFill>
+                  <a:srgbClr val="000000"/>
+                </a:solidFill>
+                <a:latin typeface="Cascadia Mono" panose="020B0609020000020004" pitchFamily="49" charset="0"/>
+              </a:rPr>
+              <a:t>    </a:t>
+            </a:r>
+            <a:r>
+              <a:rPr lang="en-US" altLang="ko-KR" sz="1800" dirty="0">
+                <a:solidFill>
+                  <a:srgbClr val="0000FF"/>
+                </a:solidFill>
+                <a:latin typeface="Cascadia Mono" panose="020B0609020000020004" pitchFamily="49" charset="0"/>
+              </a:rPr>
+              <a:t>member</a:t>
+            </a:r>
+            <a:r>
+              <a:rPr lang="en-US" altLang="ko-KR" sz="1800" dirty="0">
+                <a:solidFill>
+                  <a:srgbClr val="000000"/>
+                </a:solidFill>
+                <a:latin typeface="Cascadia Mono" panose="020B0609020000020004" pitchFamily="49" charset="0"/>
+              </a:rPr>
+              <a:t> _.Name = timerStruct.Name</a:t>
+            </a:r>
+          </a:p>
+          <a:p>
+            <a:r>
+              <a:rPr lang="en-US" altLang="ko-KR" sz="1800" dirty="0">
+                <a:solidFill>
+                  <a:srgbClr val="000000"/>
+                </a:solidFill>
+                <a:latin typeface="Cascadia Mono" panose="020B0609020000020004" pitchFamily="49" charset="0"/>
+              </a:rPr>
+              <a:t>    </a:t>
+            </a:r>
+            <a:r>
+              <a:rPr lang="en-US" altLang="ko-KR" sz="1800" dirty="0">
+                <a:solidFill>
+                  <a:srgbClr val="0000FF"/>
+                </a:solidFill>
+                <a:latin typeface="Cascadia Mono" panose="020B0609020000020004" pitchFamily="49" charset="0"/>
+              </a:rPr>
+              <a:t>member</a:t>
+            </a:r>
+            <a:r>
+              <a:rPr lang="en-US" altLang="ko-KR" sz="1800" dirty="0">
+                <a:solidFill>
+                  <a:srgbClr val="000000"/>
+                </a:solidFill>
+                <a:latin typeface="Cascadia Mono" panose="020B0609020000020004" pitchFamily="49" charset="0"/>
+              </a:rPr>
+              <a:t> _.EN = timerStruct.EN</a:t>
+            </a:r>
+          </a:p>
+          <a:p>
+            <a:r>
+              <a:rPr lang="en-US" altLang="ko-KR" sz="1800" dirty="0">
+                <a:solidFill>
+                  <a:srgbClr val="000000"/>
+                </a:solidFill>
+                <a:latin typeface="Cascadia Mono" panose="020B0609020000020004" pitchFamily="49" charset="0"/>
+              </a:rPr>
+              <a:t>    </a:t>
+            </a:r>
+            <a:r>
+              <a:rPr lang="en-US" altLang="ko-KR" sz="1800" dirty="0">
+                <a:solidFill>
+                  <a:srgbClr val="0000FF"/>
+                </a:solidFill>
+                <a:latin typeface="Cascadia Mono" panose="020B0609020000020004" pitchFamily="49" charset="0"/>
+              </a:rPr>
+              <a:t>member</a:t>
+            </a:r>
+            <a:r>
+              <a:rPr lang="en-US" altLang="ko-KR" sz="1800" dirty="0">
+                <a:solidFill>
+                  <a:srgbClr val="000000"/>
+                </a:solidFill>
+                <a:latin typeface="Cascadia Mono" panose="020B0609020000020004" pitchFamily="49" charset="0"/>
+              </a:rPr>
+              <a:t> _.TT = timerStruct.TT</a:t>
+            </a:r>
+          </a:p>
+          <a:p>
+            <a:r>
+              <a:rPr lang="en-US" altLang="ko-KR" sz="1800" dirty="0">
+                <a:solidFill>
+                  <a:srgbClr val="000000"/>
+                </a:solidFill>
+                <a:latin typeface="Cascadia Mono" panose="020B0609020000020004" pitchFamily="49" charset="0"/>
+              </a:rPr>
+              <a:t>    </a:t>
+            </a:r>
+            <a:r>
+              <a:rPr lang="en-US" altLang="ko-KR" sz="1800" dirty="0">
+                <a:solidFill>
+                  <a:srgbClr val="0000FF"/>
+                </a:solidFill>
+                <a:latin typeface="Cascadia Mono" panose="020B0609020000020004" pitchFamily="49" charset="0"/>
+              </a:rPr>
+              <a:t>member</a:t>
+            </a:r>
+            <a:r>
+              <a:rPr lang="en-US" altLang="ko-KR" sz="1800" dirty="0">
+                <a:solidFill>
+                  <a:srgbClr val="000000"/>
+                </a:solidFill>
+                <a:latin typeface="Cascadia Mono" panose="020B0609020000020004" pitchFamily="49" charset="0"/>
+              </a:rPr>
+              <a:t> _.DN = timerStruct.DN</a:t>
+            </a:r>
+          </a:p>
+          <a:p>
+            <a:r>
+              <a:rPr lang="en-US" altLang="ko-KR" sz="1800" dirty="0">
+                <a:solidFill>
+                  <a:srgbClr val="000000"/>
+                </a:solidFill>
+                <a:latin typeface="Cascadia Mono" panose="020B0609020000020004" pitchFamily="49" charset="0"/>
+              </a:rPr>
+              <a:t>    </a:t>
+            </a:r>
+            <a:r>
+              <a:rPr lang="en-US" altLang="ko-KR" sz="1800" dirty="0">
+                <a:solidFill>
+                  <a:srgbClr val="0000FF"/>
+                </a:solidFill>
+                <a:latin typeface="Cascadia Mono" panose="020B0609020000020004" pitchFamily="49" charset="0"/>
+              </a:rPr>
+              <a:t>member</a:t>
+            </a:r>
+            <a:r>
+              <a:rPr lang="en-US" altLang="ko-KR" sz="1800" dirty="0">
+                <a:solidFill>
+                  <a:srgbClr val="000000"/>
+                </a:solidFill>
+                <a:latin typeface="Cascadia Mono" panose="020B0609020000020004" pitchFamily="49" charset="0"/>
+              </a:rPr>
+              <a:t> _.PRE = timerStruct.PRE</a:t>
+            </a:r>
+          </a:p>
+          <a:p>
+            <a:r>
+              <a:rPr lang="en-US" altLang="ko-KR" sz="1800" dirty="0">
+                <a:solidFill>
+                  <a:srgbClr val="000000"/>
+                </a:solidFill>
+                <a:latin typeface="Cascadia Mono" panose="020B0609020000020004" pitchFamily="49" charset="0"/>
+              </a:rPr>
+              <a:t>    </a:t>
+            </a:r>
+            <a:r>
+              <a:rPr lang="en-US" altLang="ko-KR" sz="1800" dirty="0">
+                <a:solidFill>
+                  <a:srgbClr val="0000FF"/>
+                </a:solidFill>
+                <a:latin typeface="Cascadia Mono" panose="020B0609020000020004" pitchFamily="49" charset="0"/>
+              </a:rPr>
+              <a:t>member</a:t>
+            </a:r>
+            <a:r>
+              <a:rPr lang="en-US" altLang="ko-KR" sz="1800" dirty="0">
+                <a:solidFill>
+                  <a:srgbClr val="000000"/>
+                </a:solidFill>
+                <a:latin typeface="Cascadia Mono" panose="020B0609020000020004" pitchFamily="49" charset="0"/>
+              </a:rPr>
+              <a:t> _.ACC = timerStruct.ACC</a:t>
+            </a:r>
+          </a:p>
+          <a:p>
+            <a:r>
+              <a:rPr lang="en-US" altLang="ko-KR" sz="1800" dirty="0">
+                <a:solidFill>
+                  <a:srgbClr val="000000"/>
+                </a:solidFill>
+                <a:latin typeface="Cascadia Mono" panose="020B0609020000020004" pitchFamily="49" charset="0"/>
+              </a:rPr>
+              <a:t>    </a:t>
+            </a:r>
+            <a:r>
+              <a:rPr lang="en-US" altLang="ko-KR" sz="1800" dirty="0">
+                <a:solidFill>
+                  <a:srgbClr val="0000FF"/>
+                </a:solidFill>
+                <a:latin typeface="Cascadia Mono" panose="020B0609020000020004" pitchFamily="49" charset="0"/>
+              </a:rPr>
+              <a:t>member</a:t>
+            </a:r>
+            <a:r>
+              <a:rPr lang="en-US" altLang="ko-KR" sz="1800" dirty="0">
+                <a:solidFill>
+                  <a:srgbClr val="000000"/>
+                </a:solidFill>
+                <a:latin typeface="Cascadia Mono" panose="020B0609020000020004" pitchFamily="49" charset="0"/>
+              </a:rPr>
+              <a:t> _.RES = timerStruct.RES</a:t>
+            </a:r>
+          </a:p>
+          <a:p>
+            <a:endParaRPr lang="ko-KR" altLang="en-US" sz="1800" dirty="0">
+              <a:solidFill>
+                <a:srgbClr val="000000"/>
+              </a:solidFill>
+              <a:latin typeface="Cascadia Mono" panose="020B0609020000020004" pitchFamily="49" charset="0"/>
+            </a:endParaRPr>
+          </a:p>
+          <a:p>
+            <a:r>
+              <a:rPr lang="en-US" altLang="ko-KR" sz="1800" dirty="0">
+                <a:solidFill>
+                  <a:srgbClr val="000000"/>
+                </a:solidFill>
+                <a:latin typeface="Cascadia Mono" panose="020B0609020000020004" pitchFamily="49" charset="0"/>
+              </a:rPr>
+              <a:t>    </a:t>
+            </a:r>
+            <a:r>
+              <a:rPr lang="en-US" altLang="ko-KR" sz="1800" dirty="0">
+                <a:solidFill>
+                  <a:srgbClr val="0000FF"/>
+                </a:solidFill>
+                <a:latin typeface="Cascadia Mono" panose="020B0609020000020004" pitchFamily="49" charset="0"/>
+              </a:rPr>
+              <a:t>member</a:t>
+            </a:r>
+            <a:r>
+              <a:rPr lang="en-US" altLang="ko-KR" sz="1800" dirty="0">
+                <a:solidFill>
+                  <a:srgbClr val="000000"/>
+                </a:solidFill>
+                <a:latin typeface="Cascadia Mono" panose="020B0609020000020004" pitchFamily="49" charset="0"/>
+              </a:rPr>
+              <a:t> </a:t>
+            </a:r>
+            <a:r>
+              <a:rPr lang="en-US" altLang="ko-KR" sz="1800" dirty="0">
+                <a:solidFill>
+                  <a:srgbClr val="0000FF"/>
+                </a:solidFill>
+                <a:latin typeface="Cascadia Mono" panose="020B0609020000020004" pitchFamily="49" charset="0"/>
+              </a:rPr>
+              <a:t>val</a:t>
+            </a:r>
+            <a:r>
+              <a:rPr lang="en-US" altLang="ko-KR" sz="1800" dirty="0">
+                <a:solidFill>
+                  <a:srgbClr val="000000"/>
+                </a:solidFill>
+                <a:latin typeface="Cascadia Mono" panose="020B0609020000020004" pitchFamily="49" charset="0"/>
+              </a:rPr>
+              <a:t> </a:t>
+            </a:r>
+            <a:r>
+              <a:rPr lang="en-US" altLang="ko-KR" sz="1800" dirty="0">
+                <a:solidFill>
+                  <a:srgbClr val="0070C0"/>
+                </a:solidFill>
+                <a:latin typeface="Cascadia Mono" panose="020B0609020000020004" pitchFamily="49" charset="0"/>
+              </a:rPr>
+              <a:t>InputEvaluateStatements</a:t>
+            </a:r>
+            <a:r>
+              <a:rPr lang="en-US" altLang="ko-KR" sz="1800" dirty="0">
+                <a:solidFill>
+                  <a:srgbClr val="000000"/>
+                </a:solidFill>
+                <a:latin typeface="Cascadia Mono" panose="020B0609020000020004" pitchFamily="49" charset="0"/>
+              </a:rPr>
+              <a:t>:</a:t>
+            </a:r>
+            <a:r>
+              <a:rPr lang="en-US" altLang="ko-KR" sz="1800" dirty="0">
+                <a:solidFill>
+                  <a:srgbClr val="FF0000"/>
+                </a:solidFill>
+                <a:latin typeface="Cascadia Mono" panose="020B0609020000020004" pitchFamily="49" charset="0"/>
+              </a:rPr>
+              <a:t>Statement list </a:t>
+            </a:r>
+            <a:r>
+              <a:rPr lang="en-US" altLang="ko-KR" sz="1800" dirty="0">
+                <a:solidFill>
+                  <a:srgbClr val="000000"/>
+                </a:solidFill>
+                <a:latin typeface="Cascadia Mono" panose="020B0609020000020004" pitchFamily="49" charset="0"/>
+              </a:rPr>
+              <a:t>= [] </a:t>
+            </a:r>
+            <a:r>
+              <a:rPr lang="en-US" altLang="ko-KR" sz="1800" dirty="0">
+                <a:solidFill>
+                  <a:srgbClr val="0000FF"/>
+                </a:solidFill>
+                <a:latin typeface="Cascadia Mono" panose="020B0609020000020004" pitchFamily="49" charset="0"/>
+              </a:rPr>
+              <a:t>with</a:t>
+            </a:r>
+            <a:r>
+              <a:rPr lang="en-US" altLang="ko-KR" sz="1800" dirty="0">
+                <a:solidFill>
+                  <a:srgbClr val="000000"/>
+                </a:solidFill>
+                <a:latin typeface="Cascadia Mono" panose="020B0609020000020004" pitchFamily="49" charset="0"/>
+              </a:rPr>
+              <a:t> get, set</a:t>
+            </a:r>
+          </a:p>
+          <a:p>
+            <a:r>
+              <a:rPr lang="en-US" altLang="ko-KR" sz="1800" dirty="0">
+                <a:solidFill>
+                  <a:srgbClr val="000000"/>
+                </a:solidFill>
+                <a:latin typeface="Cascadia Mono" panose="020B0609020000020004" pitchFamily="49" charset="0"/>
+              </a:rPr>
+              <a:t>    </a:t>
+            </a:r>
+            <a:r>
+              <a:rPr lang="en-US" altLang="ko-KR" sz="1800" dirty="0">
+                <a:solidFill>
+                  <a:srgbClr val="0000FF"/>
+                </a:solidFill>
+                <a:latin typeface="Cascadia Mono" panose="020B0609020000020004" pitchFamily="49" charset="0"/>
+              </a:rPr>
+              <a:t>interface</a:t>
+            </a:r>
+            <a:r>
+              <a:rPr lang="en-US" altLang="ko-KR" sz="1800" dirty="0">
+                <a:solidFill>
+                  <a:srgbClr val="000000"/>
+                </a:solidFill>
+                <a:latin typeface="Cascadia Mono" panose="020B0609020000020004" pitchFamily="49" charset="0"/>
+              </a:rPr>
+              <a:t> IDisposable </a:t>
+            </a:r>
+            <a:r>
+              <a:rPr lang="en-US" altLang="ko-KR" sz="1800" dirty="0">
+                <a:solidFill>
+                  <a:srgbClr val="0000FF"/>
+                </a:solidFill>
+                <a:latin typeface="Cascadia Mono" panose="020B0609020000020004" pitchFamily="49" charset="0"/>
+              </a:rPr>
+              <a:t>with</a:t>
+            </a:r>
+            <a:endParaRPr lang="en-US" altLang="ko-KR" sz="1800" dirty="0">
+              <a:solidFill>
+                <a:srgbClr val="000000"/>
+              </a:solidFill>
+              <a:latin typeface="Cascadia Mono" panose="020B0609020000020004" pitchFamily="49" charset="0"/>
+            </a:endParaRPr>
+          </a:p>
+          <a:p>
+            <a:r>
+              <a:rPr lang="en-US" altLang="ko-KR" sz="1800" dirty="0">
+                <a:solidFill>
+                  <a:srgbClr val="000000"/>
+                </a:solidFill>
+                <a:latin typeface="Cascadia Mono" panose="020B0609020000020004" pitchFamily="49" charset="0"/>
+              </a:rPr>
+              <a:t>        </a:t>
+            </a:r>
+            <a:r>
+              <a:rPr lang="en-US" altLang="ko-KR" sz="1800" dirty="0">
+                <a:solidFill>
+                  <a:srgbClr val="0000FF"/>
+                </a:solidFill>
+                <a:latin typeface="Cascadia Mono" panose="020B0609020000020004" pitchFamily="49" charset="0"/>
+              </a:rPr>
+              <a:t>member</a:t>
+            </a:r>
+            <a:r>
+              <a:rPr lang="en-US" altLang="ko-KR" sz="1800" dirty="0">
+                <a:solidFill>
+                  <a:srgbClr val="000000"/>
+                </a:solidFill>
+                <a:latin typeface="Cascadia Mono" panose="020B0609020000020004" pitchFamily="49" charset="0"/>
+              </a:rPr>
+              <a:t> _.Dispose() = (accumulator :&gt; IDisposable).Dispose()</a:t>
+            </a:r>
+          </a:p>
+        </p:txBody>
+      </p:sp>
+    </p:spTree>
+    <p:extLst>
+      <p:ext uri="{BB962C8B-B14F-4D97-AF65-F5344CB8AC3E}">
+        <p14:creationId xmlns:p14="http://schemas.microsoft.com/office/powerpoint/2010/main" val="3718364714"/>
+      </p:ext>
+    </p:extLst>
+  </p:cSld>
+  <p:clrMapOvr>
+    <a:masterClrMapping/>
+  </p:clrMapOvr>
+</p:sld>
+</file>
+
+<file path=ppt/slides/slide15.xml><?xml version="1.0" encoding="utf-8"?>
+<p:sld xmlns:a="http://schemas.openxmlformats.org/drawingml/2006/main" xmlns:r="http://schemas.openxmlformats.org/officeDocument/2006/relationships" xmlns:p="http://schemas.openxmlformats.org/presentationml/2006/main">
+  <p:cSld>
+    <p:spTree>
+      <p:nvGrpSpPr>
+        <p:cNvPr id="1" name=""/>
+        <p:cNvGrpSpPr/>
+        <p:nvPr/>
+      </p:nvGrpSpPr>
+      <p:grpSpPr>
+        <a:xfrm>
+          <a:off x="0" y="0"/>
+          <a:ext cx="0" cy="0"/>
+          <a:chOff x="0" y="0"/>
+          <a:chExt cx="0" cy="0"/>
+        </a:xfrm>
+      </p:grpSpPr>
+      <p:sp>
+        <p:nvSpPr>
+          <p:cNvPr id="2" name="제목 1">
+            <a:extLst>
+              <a:ext uri="{FF2B5EF4-FFF2-40B4-BE49-F238E27FC236}">
                 <a16:creationId xmlns:a16="http://schemas.microsoft.com/office/drawing/2014/main" id="{25874C6A-7830-36B5-7B9C-4C212CF8C2B2}"/>
               </a:ext>
             </a:extLst>
@@ -5893,7 +6091,7 @@
 </p:sld>
 </file>
 
-<file path=ppt/slides/slide14.xml><?xml version="1.0" encoding="utf-8"?>
+<file path=ppt/slides/slide16.xml><?xml version="1.0" encoding="utf-8"?>
 <p:sld xmlns:a="http://schemas.openxmlformats.org/drawingml/2006/main" xmlns:r="http://schemas.openxmlformats.org/officeDocument/2006/relationships" xmlns:p="http://schemas.openxmlformats.org/presentationml/2006/main">
   <p:cSld>
     <p:spTree>

</xml_diff>

<commit_message>
- UnitTest.PLC.Xgi : Xgi Statement adaptor/convertor 작성 중.
</commit_message>
<xml_diff>
--- a/DsDotNet/src/Engine/Engine.Core/Timer.pptx
+++ b/DsDotNet/src/Engine/Engine.Core/Timer.pptx
@@ -16,11 +16,16 @@
     <p:sldId id="264" r:id="rId10"/>
     <p:sldId id="271" r:id="rId11"/>
     <p:sldId id="270" r:id="rId12"/>
-    <p:sldId id="265" r:id="rId13"/>
-    <p:sldId id="266" r:id="rId14"/>
-    <p:sldId id="267" r:id="rId15"/>
-    <p:sldId id="268" r:id="rId16"/>
-    <p:sldId id="269" r:id="rId17"/>
+    <p:sldId id="274" r:id="rId13"/>
+    <p:sldId id="275" r:id="rId14"/>
+    <p:sldId id="276" r:id="rId15"/>
+    <p:sldId id="265" r:id="rId16"/>
+    <p:sldId id="266" r:id="rId17"/>
+    <p:sldId id="267" r:id="rId18"/>
+    <p:sldId id="268" r:id="rId19"/>
+    <p:sldId id="269" r:id="rId20"/>
+    <p:sldId id="272" r:id="rId21"/>
+    <p:sldId id="273" r:id="rId22"/>
   </p:sldIdLst>
   <p:sldSz cx="12192000" cy="6858000"/>
   <p:notesSz cx="6858000" cy="9144000"/>
@@ -274,7 +279,7 @@
           <a:p>
             <a:fld id="{F0D11F29-D168-44AB-8C51-C78796B9CFB4}" type="datetimeFigureOut">
               <a:rPr lang="ko-KR" altLang="en-US" smtClean="0"/>
-              <a:t>2022-12-19</a:t>
+              <a:t>2023-01-02</a:t>
             </a:fld>
             <a:endParaRPr lang="ko-KR" altLang="en-US" dirty="0"/>
           </a:p>
@@ -472,7 +477,7 @@
           <a:p>
             <a:fld id="{F0D11F29-D168-44AB-8C51-C78796B9CFB4}" type="datetimeFigureOut">
               <a:rPr lang="ko-KR" altLang="en-US" smtClean="0"/>
-              <a:t>2022-12-19</a:t>
+              <a:t>2023-01-02</a:t>
             </a:fld>
             <a:endParaRPr lang="ko-KR" altLang="en-US" dirty="0"/>
           </a:p>
@@ -680,7 +685,7 @@
           <a:p>
             <a:fld id="{F0D11F29-D168-44AB-8C51-C78796B9CFB4}" type="datetimeFigureOut">
               <a:rPr lang="ko-KR" altLang="en-US" smtClean="0"/>
-              <a:t>2022-12-19</a:t>
+              <a:t>2023-01-02</a:t>
             </a:fld>
             <a:endParaRPr lang="ko-KR" altLang="en-US" dirty="0"/>
           </a:p>
@@ -878,7 +883,7 @@
           <a:p>
             <a:fld id="{F0D11F29-D168-44AB-8C51-C78796B9CFB4}" type="datetimeFigureOut">
               <a:rPr lang="ko-KR" altLang="en-US" smtClean="0"/>
-              <a:t>2022-12-19</a:t>
+              <a:t>2023-01-02</a:t>
             </a:fld>
             <a:endParaRPr lang="ko-KR" altLang="en-US" dirty="0"/>
           </a:p>
@@ -1153,7 +1158,7 @@
           <a:p>
             <a:fld id="{F0D11F29-D168-44AB-8C51-C78796B9CFB4}" type="datetimeFigureOut">
               <a:rPr lang="ko-KR" altLang="en-US" smtClean="0"/>
-              <a:t>2022-12-19</a:t>
+              <a:t>2023-01-02</a:t>
             </a:fld>
             <a:endParaRPr lang="ko-KR" altLang="en-US" dirty="0"/>
           </a:p>
@@ -1418,7 +1423,7 @@
           <a:p>
             <a:fld id="{F0D11F29-D168-44AB-8C51-C78796B9CFB4}" type="datetimeFigureOut">
               <a:rPr lang="ko-KR" altLang="en-US" smtClean="0"/>
-              <a:t>2022-12-19</a:t>
+              <a:t>2023-01-02</a:t>
             </a:fld>
             <a:endParaRPr lang="ko-KR" altLang="en-US" dirty="0"/>
           </a:p>
@@ -1830,7 +1835,7 @@
           <a:p>
             <a:fld id="{F0D11F29-D168-44AB-8C51-C78796B9CFB4}" type="datetimeFigureOut">
               <a:rPr lang="ko-KR" altLang="en-US" smtClean="0"/>
-              <a:t>2022-12-19</a:t>
+              <a:t>2023-01-02</a:t>
             </a:fld>
             <a:endParaRPr lang="ko-KR" altLang="en-US" dirty="0"/>
           </a:p>
@@ -1971,7 +1976,7 @@
           <a:p>
             <a:fld id="{F0D11F29-D168-44AB-8C51-C78796B9CFB4}" type="datetimeFigureOut">
               <a:rPr lang="ko-KR" altLang="en-US" smtClean="0"/>
-              <a:t>2022-12-19</a:t>
+              <a:t>2023-01-02</a:t>
             </a:fld>
             <a:endParaRPr lang="ko-KR" altLang="en-US" dirty="0"/>
           </a:p>
@@ -2084,7 +2089,7 @@
           <a:p>
             <a:fld id="{F0D11F29-D168-44AB-8C51-C78796B9CFB4}" type="datetimeFigureOut">
               <a:rPr lang="ko-KR" altLang="en-US" smtClean="0"/>
-              <a:t>2022-12-19</a:t>
+              <a:t>2023-01-02</a:t>
             </a:fld>
             <a:endParaRPr lang="ko-KR" altLang="en-US" dirty="0"/>
           </a:p>
@@ -2395,7 +2400,7 @@
           <a:p>
             <a:fld id="{F0D11F29-D168-44AB-8C51-C78796B9CFB4}" type="datetimeFigureOut">
               <a:rPr lang="ko-KR" altLang="en-US" smtClean="0"/>
-              <a:t>2022-12-19</a:t>
+              <a:t>2023-01-02</a:t>
             </a:fld>
             <a:endParaRPr lang="ko-KR" altLang="en-US" dirty="0"/>
           </a:p>
@@ -2683,7 +2688,7 @@
           <a:p>
             <a:fld id="{F0D11F29-D168-44AB-8C51-C78796B9CFB4}" type="datetimeFigureOut">
               <a:rPr lang="ko-KR" altLang="en-US" smtClean="0"/>
-              <a:t>2022-12-19</a:t>
+              <a:t>2023-01-02</a:t>
             </a:fld>
             <a:endParaRPr lang="ko-KR" altLang="en-US" dirty="0"/>
           </a:p>
@@ -2924,7 +2929,7 @@
           <a:p>
             <a:fld id="{F0D11F29-D168-44AB-8C51-C78796B9CFB4}" type="datetimeFigureOut">
               <a:rPr lang="ko-KR" altLang="en-US" smtClean="0"/>
-              <a:t>2022-12-19</a:t>
+              <a:t>2023-01-02</a:t>
             </a:fld>
             <a:endParaRPr lang="ko-KR" altLang="en-US" dirty="0"/>
           </a:p>
@@ -3626,6 +3631,304 @@
           <p:cNvPr id="2" name="제목 1">
             <a:extLst>
               <a:ext uri="{FF2B5EF4-FFF2-40B4-BE49-F238E27FC236}">
+                <a16:creationId xmlns:a16="http://schemas.microsoft.com/office/drawing/2014/main" id="{970ED5B0-B1A6-1FC1-C865-BC2D394F99CC}"/>
+              </a:ext>
+            </a:extLst>
+          </p:cNvPr>
+          <p:cNvSpPr>
+            <a:spLocks noGrp="1"/>
+          </p:cNvSpPr>
+          <p:nvPr>
+            <p:ph type="title"/>
+          </p:nvPr>
+        </p:nvSpPr>
+        <p:spPr>
+          <a:xfrm>
+            <a:off x="838200" y="365126"/>
+            <a:ext cx="2627811" cy="867138"/>
+          </a:xfrm>
+        </p:spPr>
+        <p:txBody>
+          <a:bodyPr>
+            <a:normAutofit/>
+          </a:bodyPr>
+          <a:lstStyle/>
+          <a:p>
+            <a:r>
+              <a:rPr lang="ko-KR" altLang="en-US" dirty="0"/>
+              <a:t>산전 </a:t>
+            </a:r>
+            <a:r>
+              <a:rPr lang="en-US" altLang="ko-KR" dirty="0"/>
+              <a:t>CTU</a:t>
+            </a:r>
+            <a:endParaRPr lang="ko-KR" altLang="en-US" dirty="0"/>
+          </a:p>
+        </p:txBody>
+      </p:sp>
+      <p:pic>
+        <p:nvPicPr>
+          <p:cNvPr id="7" name="그림 6">
+            <a:extLst>
+              <a:ext uri="{FF2B5EF4-FFF2-40B4-BE49-F238E27FC236}">
+                <a16:creationId xmlns:a16="http://schemas.microsoft.com/office/drawing/2014/main" id="{DA56FB1C-5DF3-F5A0-7DE6-409B7628D1D9}"/>
+              </a:ext>
+            </a:extLst>
+          </p:cNvPr>
+          <p:cNvPicPr>
+            <a:picLocks noChangeAspect="1"/>
+          </p:cNvPicPr>
+          <p:nvPr/>
+        </p:nvPicPr>
+        <p:blipFill>
+          <a:blip r:embed="rId2"/>
+          <a:stretch>
+            <a:fillRect/>
+          </a:stretch>
+        </p:blipFill>
+        <p:spPr>
+          <a:xfrm>
+            <a:off x="3322320" y="1108958"/>
+            <a:ext cx="6850380" cy="5729991"/>
+          </a:xfrm>
+          <a:prstGeom prst="rect">
+            <a:avLst/>
+          </a:prstGeom>
+        </p:spPr>
+      </p:pic>
+    </p:spTree>
+    <p:extLst>
+      <p:ext uri="{BB962C8B-B14F-4D97-AF65-F5344CB8AC3E}">
+        <p14:creationId xmlns:p14="http://schemas.microsoft.com/office/powerpoint/2010/main" val="1645704653"/>
+      </p:ext>
+    </p:extLst>
+  </p:cSld>
+  <p:clrMapOvr>
+    <a:masterClrMapping/>
+  </p:clrMapOvr>
+</p:sld>
+</file>
+
+<file path=ppt/slides/slide13.xml><?xml version="1.0" encoding="utf-8"?>
+<p:sld xmlns:a="http://schemas.openxmlformats.org/drawingml/2006/main" xmlns:r="http://schemas.openxmlformats.org/officeDocument/2006/relationships" xmlns:p="http://schemas.openxmlformats.org/presentationml/2006/main">
+  <p:cSld>
+    <p:spTree>
+      <p:nvGrpSpPr>
+        <p:cNvPr id="1" name=""/>
+        <p:cNvGrpSpPr/>
+        <p:nvPr/>
+      </p:nvGrpSpPr>
+      <p:grpSpPr>
+        <a:xfrm>
+          <a:off x="0" y="0"/>
+          <a:ext cx="0" cy="0"/>
+          <a:chOff x="0" y="0"/>
+          <a:chExt cx="0" cy="0"/>
+        </a:xfrm>
+      </p:grpSpPr>
+      <p:sp>
+        <p:nvSpPr>
+          <p:cNvPr id="2" name="제목 1">
+            <a:extLst>
+              <a:ext uri="{FF2B5EF4-FFF2-40B4-BE49-F238E27FC236}">
+                <a16:creationId xmlns:a16="http://schemas.microsoft.com/office/drawing/2014/main" id="{970ED5B0-B1A6-1FC1-C865-BC2D394F99CC}"/>
+              </a:ext>
+            </a:extLst>
+          </p:cNvPr>
+          <p:cNvSpPr>
+            <a:spLocks noGrp="1"/>
+          </p:cNvSpPr>
+          <p:nvPr>
+            <p:ph type="title"/>
+          </p:nvPr>
+        </p:nvSpPr>
+        <p:spPr>
+          <a:xfrm>
+            <a:off x="838200" y="365126"/>
+            <a:ext cx="2627811" cy="867138"/>
+          </a:xfrm>
+        </p:spPr>
+        <p:txBody>
+          <a:bodyPr/>
+          <a:lstStyle/>
+          <a:p>
+            <a:r>
+              <a:rPr lang="ko-KR" altLang="en-US" dirty="0"/>
+              <a:t>산전 </a:t>
+            </a:r>
+            <a:r>
+              <a:rPr lang="en-US" altLang="ko-KR" dirty="0"/>
+              <a:t>CTD</a:t>
+            </a:r>
+            <a:endParaRPr lang="ko-KR" altLang="en-US" dirty="0"/>
+          </a:p>
+        </p:txBody>
+      </p:sp>
+      <p:pic>
+        <p:nvPicPr>
+          <p:cNvPr id="5" name="그림 4">
+            <a:extLst>
+              <a:ext uri="{FF2B5EF4-FFF2-40B4-BE49-F238E27FC236}">
+                <a16:creationId xmlns:a16="http://schemas.microsoft.com/office/drawing/2014/main" id="{2B963DB8-0214-D641-7447-AB6F23E2B751}"/>
+              </a:ext>
+            </a:extLst>
+          </p:cNvPr>
+          <p:cNvPicPr>
+            <a:picLocks noChangeAspect="1"/>
+          </p:cNvPicPr>
+          <p:nvPr/>
+        </p:nvPicPr>
+        <p:blipFill>
+          <a:blip r:embed="rId2"/>
+          <a:stretch>
+            <a:fillRect/>
+          </a:stretch>
+        </p:blipFill>
+        <p:spPr>
+          <a:xfrm>
+            <a:off x="3661954" y="1436985"/>
+            <a:ext cx="6472646" cy="5297189"/>
+          </a:xfrm>
+          <a:prstGeom prst="rect">
+            <a:avLst/>
+          </a:prstGeom>
+        </p:spPr>
+      </p:pic>
+    </p:spTree>
+    <p:extLst>
+      <p:ext uri="{BB962C8B-B14F-4D97-AF65-F5344CB8AC3E}">
+        <p14:creationId xmlns:p14="http://schemas.microsoft.com/office/powerpoint/2010/main" val="656807519"/>
+      </p:ext>
+    </p:extLst>
+  </p:cSld>
+  <p:clrMapOvr>
+    <a:masterClrMapping/>
+  </p:clrMapOvr>
+</p:sld>
+</file>
+
+<file path=ppt/slides/slide14.xml><?xml version="1.0" encoding="utf-8"?>
+<p:sld xmlns:a="http://schemas.openxmlformats.org/drawingml/2006/main" xmlns:r="http://schemas.openxmlformats.org/officeDocument/2006/relationships" xmlns:p="http://schemas.openxmlformats.org/presentationml/2006/main">
+  <p:cSld>
+    <p:spTree>
+      <p:nvGrpSpPr>
+        <p:cNvPr id="1" name=""/>
+        <p:cNvGrpSpPr/>
+        <p:nvPr/>
+      </p:nvGrpSpPr>
+      <p:grpSpPr>
+        <a:xfrm>
+          <a:off x="0" y="0"/>
+          <a:ext cx="0" cy="0"/>
+          <a:chOff x="0" y="0"/>
+          <a:chExt cx="0" cy="0"/>
+        </a:xfrm>
+      </p:grpSpPr>
+      <p:sp>
+        <p:nvSpPr>
+          <p:cNvPr id="2" name="제목 1">
+            <a:extLst>
+              <a:ext uri="{FF2B5EF4-FFF2-40B4-BE49-F238E27FC236}">
+                <a16:creationId xmlns:a16="http://schemas.microsoft.com/office/drawing/2014/main" id="{970ED5B0-B1A6-1FC1-C865-BC2D394F99CC}"/>
+              </a:ext>
+            </a:extLst>
+          </p:cNvPr>
+          <p:cNvSpPr>
+            <a:spLocks noGrp="1"/>
+          </p:cNvSpPr>
+          <p:nvPr>
+            <p:ph type="title"/>
+          </p:nvPr>
+        </p:nvSpPr>
+        <p:spPr>
+          <a:xfrm>
+            <a:off x="838200" y="365126"/>
+            <a:ext cx="2999763" cy="867138"/>
+          </a:xfrm>
+        </p:spPr>
+        <p:txBody>
+          <a:bodyPr>
+            <a:normAutofit/>
+          </a:bodyPr>
+          <a:lstStyle/>
+          <a:p>
+            <a:r>
+              <a:rPr lang="ko-KR" altLang="en-US" dirty="0"/>
+              <a:t>산전 </a:t>
+            </a:r>
+            <a:r>
+              <a:rPr lang="en-US" altLang="ko-KR" dirty="0"/>
+              <a:t>CTUD</a:t>
+            </a:r>
+            <a:endParaRPr lang="ko-KR" altLang="en-US" dirty="0"/>
+          </a:p>
+        </p:txBody>
+      </p:sp>
+      <p:pic>
+        <p:nvPicPr>
+          <p:cNvPr id="4" name="그림 3">
+            <a:extLst>
+              <a:ext uri="{FF2B5EF4-FFF2-40B4-BE49-F238E27FC236}">
+                <a16:creationId xmlns:a16="http://schemas.microsoft.com/office/drawing/2014/main" id="{3F67B7D4-BE02-61AF-CA0E-DCB052C9CBE2}"/>
+              </a:ext>
+            </a:extLst>
+          </p:cNvPr>
+          <p:cNvPicPr>
+            <a:picLocks noChangeAspect="1"/>
+          </p:cNvPicPr>
+          <p:nvPr/>
+        </p:nvPicPr>
+        <p:blipFill>
+          <a:blip r:embed="rId2"/>
+          <a:stretch>
+            <a:fillRect/>
+          </a:stretch>
+        </p:blipFill>
+        <p:spPr>
+          <a:xfrm>
+            <a:off x="3776804" y="1166070"/>
+            <a:ext cx="5833454" cy="5691930"/>
+          </a:xfrm>
+          <a:prstGeom prst="rect">
+            <a:avLst/>
+          </a:prstGeom>
+        </p:spPr>
+      </p:pic>
+    </p:spTree>
+    <p:extLst>
+      <p:ext uri="{BB962C8B-B14F-4D97-AF65-F5344CB8AC3E}">
+        <p14:creationId xmlns:p14="http://schemas.microsoft.com/office/powerpoint/2010/main" val="1308047478"/>
+      </p:ext>
+    </p:extLst>
+  </p:cSld>
+  <p:clrMapOvr>
+    <a:masterClrMapping/>
+  </p:clrMapOvr>
+</p:sld>
+</file>
+
+<file path=ppt/slides/slide15.xml><?xml version="1.0" encoding="utf-8"?>
+<p:sld xmlns:a="http://schemas.openxmlformats.org/drawingml/2006/main" xmlns:r="http://schemas.openxmlformats.org/officeDocument/2006/relationships" xmlns:p="http://schemas.openxmlformats.org/presentationml/2006/main">
+  <p:cSld>
+    <p:spTree>
+      <p:nvGrpSpPr>
+        <p:cNvPr id="1" name=""/>
+        <p:cNvGrpSpPr/>
+        <p:nvPr/>
+      </p:nvGrpSpPr>
+      <p:grpSpPr>
+        <a:xfrm>
+          <a:off x="0" y="0"/>
+          <a:ext cx="0" cy="0"/>
+          <a:chOff x="0" y="0"/>
+          <a:chExt cx="0" cy="0"/>
+        </a:xfrm>
+      </p:grpSpPr>
+      <p:sp>
+        <p:nvSpPr>
+          <p:cNvPr id="2" name="제목 1">
+            <a:extLst>
+              <a:ext uri="{FF2B5EF4-FFF2-40B4-BE49-F238E27FC236}">
                 <a16:creationId xmlns:a16="http://schemas.microsoft.com/office/drawing/2014/main" id="{DDC757F2-A588-55CE-AB29-82077923FFA8}"/>
               </a:ext>
             </a:extLst>
@@ -4586,7 +4889,7 @@
 </p:sld>
 </file>
 
-<file path=ppt/slides/slide13.xml><?xml version="1.0" encoding="utf-8"?>
+<file path=ppt/slides/slide16.xml><?xml version="1.0" encoding="utf-8"?>
 <p:sld xmlns:a="http://schemas.openxmlformats.org/drawingml/2006/main" xmlns:r="http://schemas.openxmlformats.org/officeDocument/2006/relationships" xmlns:p="http://schemas.openxmlformats.org/presentationml/2006/main">
   <p:cSld>
     <p:spTree>
@@ -4974,7 +5277,7 @@
 </p:sld>
 </file>
 
-<file path=ppt/slides/slide14.xml><?xml version="1.0" encoding="utf-8"?>
+<file path=ppt/slides/slide17.xml><?xml version="1.0" encoding="utf-8"?>
 <p:sld xmlns:a="http://schemas.openxmlformats.org/drawingml/2006/main" xmlns:r="http://schemas.openxmlformats.org/officeDocument/2006/relationships" xmlns:p="http://schemas.openxmlformats.org/presentationml/2006/main">
   <p:cSld>
     <p:spTree>
@@ -5577,7 +5880,7 @@
 </p:sld>
 </file>
 
-<file path=ppt/slides/slide15.xml><?xml version="1.0" encoding="utf-8"?>
+<file path=ppt/slides/slide18.xml><?xml version="1.0" encoding="utf-8"?>
 <p:sld xmlns:a="http://schemas.openxmlformats.org/drawingml/2006/main" xmlns:r="http://schemas.openxmlformats.org/officeDocument/2006/relationships" xmlns:p="http://schemas.openxmlformats.org/presentationml/2006/main">
   <p:cSld>
     <p:spTree>
@@ -6091,7 +6394,7 @@
 </p:sld>
 </file>
 
-<file path=ppt/slides/slide16.xml><?xml version="1.0" encoding="utf-8"?>
+<file path=ppt/slides/slide19.xml><?xml version="1.0" encoding="utf-8"?>
 <p:sld xmlns:a="http://schemas.openxmlformats.org/drawingml/2006/main" xmlns:r="http://schemas.openxmlformats.org/officeDocument/2006/relationships" xmlns:p="http://schemas.openxmlformats.org/presentationml/2006/main">
   <p:cSld>
     <p:spTree>
@@ -6348,14 +6651,8 @@
           <a:p>
             <a:pPr lvl="1"/>
             <a:r>
-              <a:rPr lang="en-US" altLang="ko-KR" dirty="0">
-                <a:hlinkClick r:id="rId5"/>
-              </a:rPr>
-              <a:t>http://www.famart.co.kr/resource/ls/%EC%82%AC%EC%9A%A9%EC%84%A4%EB%AA%85%EC%84%9C_XGK_XGB_%EB%AA%85%EB%A0%B9%EC%96%B4%EC%A7%91_%EA%B5%AD%EB%AC%B8_V2.3.pdf</a:t>
-            </a:r>
-            <a:r>
               <a:rPr lang="en-US" altLang="ko-KR" dirty="0"/>
-              <a:t> </a:t>
+              <a:t>http://www.famart.co.kr/resource/ls/%EC%82%AC%EC%9A%A9%EC%84%A4%EB%AA%85%EC%84%9C_XGI_XGR_XEC_%EB%AA%85%EB%A0%B9%EC%96%B4%EC%A7%91_V2.7.pdf</a:t>
             </a:r>
             <a:endParaRPr lang="ko-KR" altLang="en-US" dirty="0"/>
           </a:p>
@@ -6365,6 +6662,224 @@
     <p:extLst>
       <p:ext uri="{BB962C8B-B14F-4D97-AF65-F5344CB8AC3E}">
         <p14:creationId xmlns:p14="http://schemas.microsoft.com/office/powerpoint/2010/main" val="2720908776"/>
+      </p:ext>
+    </p:extLst>
+  </p:cSld>
+  <p:clrMapOvr>
+    <a:masterClrMapping/>
+  </p:clrMapOvr>
+</p:sld>
+</file>
+
+<file path=ppt/slides/slide20.xml><?xml version="1.0" encoding="utf-8"?>
+<p:sld xmlns:a="http://schemas.openxmlformats.org/drawingml/2006/main" xmlns:r="http://schemas.openxmlformats.org/officeDocument/2006/relationships" xmlns:p="http://schemas.openxmlformats.org/presentationml/2006/main">
+  <p:cSld>
+    <p:spTree>
+      <p:nvGrpSpPr>
+        <p:cNvPr id="1" name=""/>
+        <p:cNvGrpSpPr/>
+        <p:nvPr/>
+      </p:nvGrpSpPr>
+      <p:grpSpPr>
+        <a:xfrm>
+          <a:off x="0" y="0"/>
+          <a:ext cx="0" cy="0"/>
+          <a:chOff x="0" y="0"/>
+          <a:chExt cx="0" cy="0"/>
+        </a:xfrm>
+      </p:grpSpPr>
+      <p:sp>
+        <p:nvSpPr>
+          <p:cNvPr id="4" name="제목 3">
+            <a:extLst>
+              <a:ext uri="{FF2B5EF4-FFF2-40B4-BE49-F238E27FC236}">
+                <a16:creationId xmlns:a16="http://schemas.microsoft.com/office/drawing/2014/main" id="{16EFA867-55B0-DBFC-98DB-B382AF802622}"/>
+              </a:ext>
+            </a:extLst>
+          </p:cNvPr>
+          <p:cNvSpPr>
+            <a:spLocks noGrp="1"/>
+          </p:cNvSpPr>
+          <p:nvPr>
+            <p:ph type="ctrTitle"/>
+          </p:nvPr>
+        </p:nvSpPr>
+        <p:spPr/>
+        <p:txBody>
+          <a:bodyPr/>
+          <a:lstStyle/>
+          <a:p>
+            <a:r>
+              <a:rPr lang="ko-KR" altLang="en-US" dirty="0"/>
+              <a:t>작화 특성</a:t>
+            </a:r>
+          </a:p>
+        </p:txBody>
+      </p:sp>
+      <p:sp>
+        <p:nvSpPr>
+          <p:cNvPr id="5" name="부제목 4">
+            <a:extLst>
+              <a:ext uri="{FF2B5EF4-FFF2-40B4-BE49-F238E27FC236}">
+                <a16:creationId xmlns:a16="http://schemas.microsoft.com/office/drawing/2014/main" id="{FA8BBCDC-8D02-F4D6-0F56-EEE3E53015C6}"/>
+              </a:ext>
+            </a:extLst>
+          </p:cNvPr>
+          <p:cNvSpPr>
+            <a:spLocks noGrp="1"/>
+          </p:cNvSpPr>
+          <p:nvPr>
+            <p:ph type="subTitle" idx="1"/>
+          </p:nvPr>
+        </p:nvSpPr>
+        <p:spPr/>
+        <p:txBody>
+          <a:bodyPr/>
+          <a:lstStyle/>
+          <a:p>
+            <a:endParaRPr lang="ko-KR" altLang="en-US"/>
+          </a:p>
+        </p:txBody>
+      </p:sp>
+    </p:spTree>
+    <p:extLst>
+      <p:ext uri="{BB962C8B-B14F-4D97-AF65-F5344CB8AC3E}">
+        <p14:creationId xmlns:p14="http://schemas.microsoft.com/office/powerpoint/2010/main" val="720653391"/>
+      </p:ext>
+    </p:extLst>
+  </p:cSld>
+  <p:clrMapOvr>
+    <a:masterClrMapping/>
+  </p:clrMapOvr>
+</p:sld>
+</file>
+
+<file path=ppt/slides/slide21.xml><?xml version="1.0" encoding="utf-8"?>
+<p:sld xmlns:a="http://schemas.openxmlformats.org/drawingml/2006/main" xmlns:r="http://schemas.openxmlformats.org/officeDocument/2006/relationships" xmlns:p="http://schemas.openxmlformats.org/presentationml/2006/main">
+  <p:cSld>
+    <p:spTree>
+      <p:nvGrpSpPr>
+        <p:cNvPr id="1" name=""/>
+        <p:cNvGrpSpPr/>
+        <p:nvPr/>
+      </p:nvGrpSpPr>
+      <p:grpSpPr>
+        <a:xfrm>
+          <a:off x="0" y="0"/>
+          <a:ext cx="0" cy="0"/>
+          <a:chOff x="0" y="0"/>
+          <a:chExt cx="0" cy="0"/>
+        </a:xfrm>
+      </p:grpSpPr>
+      <p:sp>
+        <p:nvSpPr>
+          <p:cNvPr id="2" name="제목 1">
+            <a:extLst>
+              <a:ext uri="{FF2B5EF4-FFF2-40B4-BE49-F238E27FC236}">
+                <a16:creationId xmlns:a16="http://schemas.microsoft.com/office/drawing/2014/main" id="{E51AE384-C5FA-1804-37B2-A4BB49FE9C63}"/>
+              </a:ext>
+            </a:extLst>
+          </p:cNvPr>
+          <p:cNvSpPr>
+            <a:spLocks noGrp="1"/>
+          </p:cNvSpPr>
+          <p:nvPr>
+            <p:ph type="title"/>
+          </p:nvPr>
+        </p:nvSpPr>
+        <p:spPr/>
+        <p:txBody>
+          <a:bodyPr/>
+          <a:lstStyle/>
+          <a:p>
+            <a:r>
+              <a:rPr lang="en-US" altLang="ko-KR" dirty="0"/>
+              <a:t>Input</a:t>
+            </a:r>
+            <a:r>
+              <a:rPr lang="ko-KR" altLang="en-US" dirty="0"/>
+              <a:t> </a:t>
+            </a:r>
+            <a:r>
+              <a:rPr lang="en-US" altLang="ko-KR" dirty="0"/>
+              <a:t>side</a:t>
+            </a:r>
+            <a:r>
+              <a:rPr lang="ko-KR" altLang="en-US" dirty="0"/>
+              <a:t> </a:t>
+            </a:r>
+            <a:r>
+              <a:rPr lang="ko-KR" altLang="en-US" dirty="0" err="1"/>
+              <a:t>다릿발</a:t>
+            </a:r>
+            <a:endParaRPr lang="ko-KR" altLang="en-US" dirty="0"/>
+          </a:p>
+        </p:txBody>
+      </p:sp>
+      <p:pic>
+        <p:nvPicPr>
+          <p:cNvPr id="5" name="그림 4">
+            <a:extLst>
+              <a:ext uri="{FF2B5EF4-FFF2-40B4-BE49-F238E27FC236}">
+                <a16:creationId xmlns:a16="http://schemas.microsoft.com/office/drawing/2014/main" id="{B4B38613-F556-BB1D-0024-D0915F8F29D2}"/>
+              </a:ext>
+            </a:extLst>
+          </p:cNvPr>
+          <p:cNvPicPr>
+            <a:picLocks noChangeAspect="1"/>
+          </p:cNvPicPr>
+          <p:nvPr/>
+        </p:nvPicPr>
+        <p:blipFill>
+          <a:blip r:embed="rId2"/>
+          <a:stretch>
+            <a:fillRect/>
+          </a:stretch>
+        </p:blipFill>
+        <p:spPr>
+          <a:xfrm>
+            <a:off x="421129" y="1485415"/>
+            <a:ext cx="4685425" cy="4099014"/>
+          </a:xfrm>
+          <a:prstGeom prst="rect">
+            <a:avLst/>
+          </a:prstGeom>
+        </p:spPr>
+      </p:pic>
+      <p:pic>
+        <p:nvPicPr>
+          <p:cNvPr id="9" name="그림 8">
+            <a:extLst>
+              <a:ext uri="{FF2B5EF4-FFF2-40B4-BE49-F238E27FC236}">
+                <a16:creationId xmlns:a16="http://schemas.microsoft.com/office/drawing/2014/main" id="{231C9CA6-EAAC-459A-2A13-691FEC12F1CC}"/>
+              </a:ext>
+            </a:extLst>
+          </p:cNvPr>
+          <p:cNvPicPr>
+            <a:picLocks noChangeAspect="1"/>
+          </p:cNvPicPr>
+          <p:nvPr/>
+        </p:nvPicPr>
+        <p:blipFill>
+          <a:blip r:embed="rId3"/>
+          <a:stretch>
+            <a:fillRect/>
+          </a:stretch>
+        </p:blipFill>
+        <p:spPr>
+          <a:xfrm>
+            <a:off x="4618653" y="3483495"/>
+            <a:ext cx="7395591" cy="2858800"/>
+          </a:xfrm>
+          <a:prstGeom prst="rect">
+            <a:avLst/>
+          </a:prstGeom>
+        </p:spPr>
+      </p:pic>
+    </p:spTree>
+    <p:extLst>
+      <p:ext uri="{BB962C8B-B14F-4D97-AF65-F5344CB8AC3E}">
+        <p14:creationId xmlns:p14="http://schemas.microsoft.com/office/powerpoint/2010/main" val="2898261055"/>
       </p:ext>
     </p:extLst>
   </p:cSld>

</xml_diff>

<commit_message>
- UnitTest.PLC.Xgi : !!!! REVERTED Xgi Statement adaptor/convertor 작성 코드.
</commit_message>
<xml_diff>
--- a/DsDotNet/src/Engine/Engine.Core/Timer.pptx
+++ b/DsDotNet/src/Engine/Engine.Core/Timer.pptx
@@ -16,11 +16,16 @@
     <p:sldId id="264" r:id="rId10"/>
     <p:sldId id="271" r:id="rId11"/>
     <p:sldId id="270" r:id="rId12"/>
-    <p:sldId id="265" r:id="rId13"/>
-    <p:sldId id="266" r:id="rId14"/>
-    <p:sldId id="267" r:id="rId15"/>
-    <p:sldId id="268" r:id="rId16"/>
-    <p:sldId id="269" r:id="rId17"/>
+    <p:sldId id="274" r:id="rId13"/>
+    <p:sldId id="275" r:id="rId14"/>
+    <p:sldId id="276" r:id="rId15"/>
+    <p:sldId id="265" r:id="rId16"/>
+    <p:sldId id="266" r:id="rId17"/>
+    <p:sldId id="267" r:id="rId18"/>
+    <p:sldId id="268" r:id="rId19"/>
+    <p:sldId id="269" r:id="rId20"/>
+    <p:sldId id="272" r:id="rId21"/>
+    <p:sldId id="273" r:id="rId22"/>
   </p:sldIdLst>
   <p:sldSz cx="12192000" cy="6858000"/>
   <p:notesSz cx="6858000" cy="9144000"/>
@@ -274,7 +279,7 @@
           <a:p>
             <a:fld id="{F0D11F29-D168-44AB-8C51-C78796B9CFB4}" type="datetimeFigureOut">
               <a:rPr lang="ko-KR" altLang="en-US" smtClean="0"/>
-              <a:t>2022-12-19</a:t>
+              <a:t>2023-01-02</a:t>
             </a:fld>
             <a:endParaRPr lang="ko-KR" altLang="en-US" dirty="0"/>
           </a:p>
@@ -472,7 +477,7 @@
           <a:p>
             <a:fld id="{F0D11F29-D168-44AB-8C51-C78796B9CFB4}" type="datetimeFigureOut">
               <a:rPr lang="ko-KR" altLang="en-US" smtClean="0"/>
-              <a:t>2022-12-19</a:t>
+              <a:t>2023-01-02</a:t>
             </a:fld>
             <a:endParaRPr lang="ko-KR" altLang="en-US" dirty="0"/>
           </a:p>
@@ -680,7 +685,7 @@
           <a:p>
             <a:fld id="{F0D11F29-D168-44AB-8C51-C78796B9CFB4}" type="datetimeFigureOut">
               <a:rPr lang="ko-KR" altLang="en-US" smtClean="0"/>
-              <a:t>2022-12-19</a:t>
+              <a:t>2023-01-02</a:t>
             </a:fld>
             <a:endParaRPr lang="ko-KR" altLang="en-US" dirty="0"/>
           </a:p>
@@ -878,7 +883,7 @@
           <a:p>
             <a:fld id="{F0D11F29-D168-44AB-8C51-C78796B9CFB4}" type="datetimeFigureOut">
               <a:rPr lang="ko-KR" altLang="en-US" smtClean="0"/>
-              <a:t>2022-12-19</a:t>
+              <a:t>2023-01-02</a:t>
             </a:fld>
             <a:endParaRPr lang="ko-KR" altLang="en-US" dirty="0"/>
           </a:p>
@@ -1153,7 +1158,7 @@
           <a:p>
             <a:fld id="{F0D11F29-D168-44AB-8C51-C78796B9CFB4}" type="datetimeFigureOut">
               <a:rPr lang="ko-KR" altLang="en-US" smtClean="0"/>
-              <a:t>2022-12-19</a:t>
+              <a:t>2023-01-02</a:t>
             </a:fld>
             <a:endParaRPr lang="ko-KR" altLang="en-US" dirty="0"/>
           </a:p>
@@ -1418,7 +1423,7 @@
           <a:p>
             <a:fld id="{F0D11F29-D168-44AB-8C51-C78796B9CFB4}" type="datetimeFigureOut">
               <a:rPr lang="ko-KR" altLang="en-US" smtClean="0"/>
-              <a:t>2022-12-19</a:t>
+              <a:t>2023-01-02</a:t>
             </a:fld>
             <a:endParaRPr lang="ko-KR" altLang="en-US" dirty="0"/>
           </a:p>
@@ -1830,7 +1835,7 @@
           <a:p>
             <a:fld id="{F0D11F29-D168-44AB-8C51-C78796B9CFB4}" type="datetimeFigureOut">
               <a:rPr lang="ko-KR" altLang="en-US" smtClean="0"/>
-              <a:t>2022-12-19</a:t>
+              <a:t>2023-01-02</a:t>
             </a:fld>
             <a:endParaRPr lang="ko-KR" altLang="en-US" dirty="0"/>
           </a:p>
@@ -1971,7 +1976,7 @@
           <a:p>
             <a:fld id="{F0D11F29-D168-44AB-8C51-C78796B9CFB4}" type="datetimeFigureOut">
               <a:rPr lang="ko-KR" altLang="en-US" smtClean="0"/>
-              <a:t>2022-12-19</a:t>
+              <a:t>2023-01-02</a:t>
             </a:fld>
             <a:endParaRPr lang="ko-KR" altLang="en-US" dirty="0"/>
           </a:p>
@@ -2084,7 +2089,7 @@
           <a:p>
             <a:fld id="{F0D11F29-D168-44AB-8C51-C78796B9CFB4}" type="datetimeFigureOut">
               <a:rPr lang="ko-KR" altLang="en-US" smtClean="0"/>
-              <a:t>2022-12-19</a:t>
+              <a:t>2023-01-02</a:t>
             </a:fld>
             <a:endParaRPr lang="ko-KR" altLang="en-US" dirty="0"/>
           </a:p>
@@ -2395,7 +2400,7 @@
           <a:p>
             <a:fld id="{F0D11F29-D168-44AB-8C51-C78796B9CFB4}" type="datetimeFigureOut">
               <a:rPr lang="ko-KR" altLang="en-US" smtClean="0"/>
-              <a:t>2022-12-19</a:t>
+              <a:t>2023-01-02</a:t>
             </a:fld>
             <a:endParaRPr lang="ko-KR" altLang="en-US" dirty="0"/>
           </a:p>
@@ -2683,7 +2688,7 @@
           <a:p>
             <a:fld id="{F0D11F29-D168-44AB-8C51-C78796B9CFB4}" type="datetimeFigureOut">
               <a:rPr lang="ko-KR" altLang="en-US" smtClean="0"/>
-              <a:t>2022-12-19</a:t>
+              <a:t>2023-01-02</a:t>
             </a:fld>
             <a:endParaRPr lang="ko-KR" altLang="en-US" dirty="0"/>
           </a:p>
@@ -2924,7 +2929,7 @@
           <a:p>
             <a:fld id="{F0D11F29-D168-44AB-8C51-C78796B9CFB4}" type="datetimeFigureOut">
               <a:rPr lang="ko-KR" altLang="en-US" smtClean="0"/>
-              <a:t>2022-12-19</a:t>
+              <a:t>2023-01-02</a:t>
             </a:fld>
             <a:endParaRPr lang="ko-KR" altLang="en-US" dirty="0"/>
           </a:p>
@@ -3626,6 +3631,304 @@
           <p:cNvPr id="2" name="제목 1">
             <a:extLst>
               <a:ext uri="{FF2B5EF4-FFF2-40B4-BE49-F238E27FC236}">
+                <a16:creationId xmlns:a16="http://schemas.microsoft.com/office/drawing/2014/main" id="{970ED5B0-B1A6-1FC1-C865-BC2D394F99CC}"/>
+              </a:ext>
+            </a:extLst>
+          </p:cNvPr>
+          <p:cNvSpPr>
+            <a:spLocks noGrp="1"/>
+          </p:cNvSpPr>
+          <p:nvPr>
+            <p:ph type="title"/>
+          </p:nvPr>
+        </p:nvSpPr>
+        <p:spPr>
+          <a:xfrm>
+            <a:off x="838200" y="365126"/>
+            <a:ext cx="2627811" cy="867138"/>
+          </a:xfrm>
+        </p:spPr>
+        <p:txBody>
+          <a:bodyPr>
+            <a:normAutofit/>
+          </a:bodyPr>
+          <a:lstStyle/>
+          <a:p>
+            <a:r>
+              <a:rPr lang="ko-KR" altLang="en-US" dirty="0"/>
+              <a:t>산전 </a:t>
+            </a:r>
+            <a:r>
+              <a:rPr lang="en-US" altLang="ko-KR" dirty="0"/>
+              <a:t>CTU</a:t>
+            </a:r>
+            <a:endParaRPr lang="ko-KR" altLang="en-US" dirty="0"/>
+          </a:p>
+        </p:txBody>
+      </p:sp>
+      <p:pic>
+        <p:nvPicPr>
+          <p:cNvPr id="7" name="그림 6">
+            <a:extLst>
+              <a:ext uri="{FF2B5EF4-FFF2-40B4-BE49-F238E27FC236}">
+                <a16:creationId xmlns:a16="http://schemas.microsoft.com/office/drawing/2014/main" id="{DA56FB1C-5DF3-F5A0-7DE6-409B7628D1D9}"/>
+              </a:ext>
+            </a:extLst>
+          </p:cNvPr>
+          <p:cNvPicPr>
+            <a:picLocks noChangeAspect="1"/>
+          </p:cNvPicPr>
+          <p:nvPr/>
+        </p:nvPicPr>
+        <p:blipFill>
+          <a:blip r:embed="rId2"/>
+          <a:stretch>
+            <a:fillRect/>
+          </a:stretch>
+        </p:blipFill>
+        <p:spPr>
+          <a:xfrm>
+            <a:off x="3322320" y="1108958"/>
+            <a:ext cx="6850380" cy="5729991"/>
+          </a:xfrm>
+          <a:prstGeom prst="rect">
+            <a:avLst/>
+          </a:prstGeom>
+        </p:spPr>
+      </p:pic>
+    </p:spTree>
+    <p:extLst>
+      <p:ext uri="{BB962C8B-B14F-4D97-AF65-F5344CB8AC3E}">
+        <p14:creationId xmlns:p14="http://schemas.microsoft.com/office/powerpoint/2010/main" val="1645704653"/>
+      </p:ext>
+    </p:extLst>
+  </p:cSld>
+  <p:clrMapOvr>
+    <a:masterClrMapping/>
+  </p:clrMapOvr>
+</p:sld>
+</file>
+
+<file path=ppt/slides/slide13.xml><?xml version="1.0" encoding="utf-8"?>
+<p:sld xmlns:a="http://schemas.openxmlformats.org/drawingml/2006/main" xmlns:r="http://schemas.openxmlformats.org/officeDocument/2006/relationships" xmlns:p="http://schemas.openxmlformats.org/presentationml/2006/main">
+  <p:cSld>
+    <p:spTree>
+      <p:nvGrpSpPr>
+        <p:cNvPr id="1" name=""/>
+        <p:cNvGrpSpPr/>
+        <p:nvPr/>
+      </p:nvGrpSpPr>
+      <p:grpSpPr>
+        <a:xfrm>
+          <a:off x="0" y="0"/>
+          <a:ext cx="0" cy="0"/>
+          <a:chOff x="0" y="0"/>
+          <a:chExt cx="0" cy="0"/>
+        </a:xfrm>
+      </p:grpSpPr>
+      <p:sp>
+        <p:nvSpPr>
+          <p:cNvPr id="2" name="제목 1">
+            <a:extLst>
+              <a:ext uri="{FF2B5EF4-FFF2-40B4-BE49-F238E27FC236}">
+                <a16:creationId xmlns:a16="http://schemas.microsoft.com/office/drawing/2014/main" id="{970ED5B0-B1A6-1FC1-C865-BC2D394F99CC}"/>
+              </a:ext>
+            </a:extLst>
+          </p:cNvPr>
+          <p:cNvSpPr>
+            <a:spLocks noGrp="1"/>
+          </p:cNvSpPr>
+          <p:nvPr>
+            <p:ph type="title"/>
+          </p:nvPr>
+        </p:nvSpPr>
+        <p:spPr>
+          <a:xfrm>
+            <a:off x="838200" y="365126"/>
+            <a:ext cx="2627811" cy="867138"/>
+          </a:xfrm>
+        </p:spPr>
+        <p:txBody>
+          <a:bodyPr/>
+          <a:lstStyle/>
+          <a:p>
+            <a:r>
+              <a:rPr lang="ko-KR" altLang="en-US" dirty="0"/>
+              <a:t>산전 </a:t>
+            </a:r>
+            <a:r>
+              <a:rPr lang="en-US" altLang="ko-KR" dirty="0"/>
+              <a:t>CTD</a:t>
+            </a:r>
+            <a:endParaRPr lang="ko-KR" altLang="en-US" dirty="0"/>
+          </a:p>
+        </p:txBody>
+      </p:sp>
+      <p:pic>
+        <p:nvPicPr>
+          <p:cNvPr id="5" name="그림 4">
+            <a:extLst>
+              <a:ext uri="{FF2B5EF4-FFF2-40B4-BE49-F238E27FC236}">
+                <a16:creationId xmlns:a16="http://schemas.microsoft.com/office/drawing/2014/main" id="{2B963DB8-0214-D641-7447-AB6F23E2B751}"/>
+              </a:ext>
+            </a:extLst>
+          </p:cNvPr>
+          <p:cNvPicPr>
+            <a:picLocks noChangeAspect="1"/>
+          </p:cNvPicPr>
+          <p:nvPr/>
+        </p:nvPicPr>
+        <p:blipFill>
+          <a:blip r:embed="rId2"/>
+          <a:stretch>
+            <a:fillRect/>
+          </a:stretch>
+        </p:blipFill>
+        <p:spPr>
+          <a:xfrm>
+            <a:off x="3661954" y="1436985"/>
+            <a:ext cx="6472646" cy="5297189"/>
+          </a:xfrm>
+          <a:prstGeom prst="rect">
+            <a:avLst/>
+          </a:prstGeom>
+        </p:spPr>
+      </p:pic>
+    </p:spTree>
+    <p:extLst>
+      <p:ext uri="{BB962C8B-B14F-4D97-AF65-F5344CB8AC3E}">
+        <p14:creationId xmlns:p14="http://schemas.microsoft.com/office/powerpoint/2010/main" val="656807519"/>
+      </p:ext>
+    </p:extLst>
+  </p:cSld>
+  <p:clrMapOvr>
+    <a:masterClrMapping/>
+  </p:clrMapOvr>
+</p:sld>
+</file>
+
+<file path=ppt/slides/slide14.xml><?xml version="1.0" encoding="utf-8"?>
+<p:sld xmlns:a="http://schemas.openxmlformats.org/drawingml/2006/main" xmlns:r="http://schemas.openxmlformats.org/officeDocument/2006/relationships" xmlns:p="http://schemas.openxmlformats.org/presentationml/2006/main">
+  <p:cSld>
+    <p:spTree>
+      <p:nvGrpSpPr>
+        <p:cNvPr id="1" name=""/>
+        <p:cNvGrpSpPr/>
+        <p:nvPr/>
+      </p:nvGrpSpPr>
+      <p:grpSpPr>
+        <a:xfrm>
+          <a:off x="0" y="0"/>
+          <a:ext cx="0" cy="0"/>
+          <a:chOff x="0" y="0"/>
+          <a:chExt cx="0" cy="0"/>
+        </a:xfrm>
+      </p:grpSpPr>
+      <p:sp>
+        <p:nvSpPr>
+          <p:cNvPr id="2" name="제목 1">
+            <a:extLst>
+              <a:ext uri="{FF2B5EF4-FFF2-40B4-BE49-F238E27FC236}">
+                <a16:creationId xmlns:a16="http://schemas.microsoft.com/office/drawing/2014/main" id="{970ED5B0-B1A6-1FC1-C865-BC2D394F99CC}"/>
+              </a:ext>
+            </a:extLst>
+          </p:cNvPr>
+          <p:cNvSpPr>
+            <a:spLocks noGrp="1"/>
+          </p:cNvSpPr>
+          <p:nvPr>
+            <p:ph type="title"/>
+          </p:nvPr>
+        </p:nvSpPr>
+        <p:spPr>
+          <a:xfrm>
+            <a:off x="838200" y="365126"/>
+            <a:ext cx="2999763" cy="867138"/>
+          </a:xfrm>
+        </p:spPr>
+        <p:txBody>
+          <a:bodyPr>
+            <a:normAutofit/>
+          </a:bodyPr>
+          <a:lstStyle/>
+          <a:p>
+            <a:r>
+              <a:rPr lang="ko-KR" altLang="en-US" dirty="0"/>
+              <a:t>산전 </a:t>
+            </a:r>
+            <a:r>
+              <a:rPr lang="en-US" altLang="ko-KR" dirty="0"/>
+              <a:t>CTUD</a:t>
+            </a:r>
+            <a:endParaRPr lang="ko-KR" altLang="en-US" dirty="0"/>
+          </a:p>
+        </p:txBody>
+      </p:sp>
+      <p:pic>
+        <p:nvPicPr>
+          <p:cNvPr id="4" name="그림 3">
+            <a:extLst>
+              <a:ext uri="{FF2B5EF4-FFF2-40B4-BE49-F238E27FC236}">
+                <a16:creationId xmlns:a16="http://schemas.microsoft.com/office/drawing/2014/main" id="{3F67B7D4-BE02-61AF-CA0E-DCB052C9CBE2}"/>
+              </a:ext>
+            </a:extLst>
+          </p:cNvPr>
+          <p:cNvPicPr>
+            <a:picLocks noChangeAspect="1"/>
+          </p:cNvPicPr>
+          <p:nvPr/>
+        </p:nvPicPr>
+        <p:blipFill>
+          <a:blip r:embed="rId2"/>
+          <a:stretch>
+            <a:fillRect/>
+          </a:stretch>
+        </p:blipFill>
+        <p:spPr>
+          <a:xfrm>
+            <a:off x="3625802" y="1040235"/>
+            <a:ext cx="5833454" cy="5691930"/>
+          </a:xfrm>
+          <a:prstGeom prst="rect">
+            <a:avLst/>
+          </a:prstGeom>
+        </p:spPr>
+      </p:pic>
+    </p:spTree>
+    <p:extLst>
+      <p:ext uri="{BB962C8B-B14F-4D97-AF65-F5344CB8AC3E}">
+        <p14:creationId xmlns:p14="http://schemas.microsoft.com/office/powerpoint/2010/main" val="1308047478"/>
+      </p:ext>
+    </p:extLst>
+  </p:cSld>
+  <p:clrMapOvr>
+    <a:masterClrMapping/>
+  </p:clrMapOvr>
+</p:sld>
+</file>
+
+<file path=ppt/slides/slide15.xml><?xml version="1.0" encoding="utf-8"?>
+<p:sld xmlns:a="http://schemas.openxmlformats.org/drawingml/2006/main" xmlns:r="http://schemas.openxmlformats.org/officeDocument/2006/relationships" xmlns:p="http://schemas.openxmlformats.org/presentationml/2006/main">
+  <p:cSld>
+    <p:spTree>
+      <p:nvGrpSpPr>
+        <p:cNvPr id="1" name=""/>
+        <p:cNvGrpSpPr/>
+        <p:nvPr/>
+      </p:nvGrpSpPr>
+      <p:grpSpPr>
+        <a:xfrm>
+          <a:off x="0" y="0"/>
+          <a:ext cx="0" cy="0"/>
+          <a:chOff x="0" y="0"/>
+          <a:chExt cx="0" cy="0"/>
+        </a:xfrm>
+      </p:grpSpPr>
+      <p:sp>
+        <p:nvSpPr>
+          <p:cNvPr id="2" name="제목 1">
+            <a:extLst>
+              <a:ext uri="{FF2B5EF4-FFF2-40B4-BE49-F238E27FC236}">
                 <a16:creationId xmlns:a16="http://schemas.microsoft.com/office/drawing/2014/main" id="{DDC757F2-A588-55CE-AB29-82077923FFA8}"/>
               </a:ext>
             </a:extLst>
@@ -4586,7 +4889,7 @@
 </p:sld>
 </file>
 
-<file path=ppt/slides/slide13.xml><?xml version="1.0" encoding="utf-8"?>
+<file path=ppt/slides/slide16.xml><?xml version="1.0" encoding="utf-8"?>
 <p:sld xmlns:a="http://schemas.openxmlformats.org/drawingml/2006/main" xmlns:r="http://schemas.openxmlformats.org/officeDocument/2006/relationships" xmlns:p="http://schemas.openxmlformats.org/presentationml/2006/main">
   <p:cSld>
     <p:spTree>
@@ -4974,7 +5277,7 @@
 </p:sld>
 </file>
 
-<file path=ppt/slides/slide14.xml><?xml version="1.0" encoding="utf-8"?>
+<file path=ppt/slides/slide17.xml><?xml version="1.0" encoding="utf-8"?>
 <p:sld xmlns:a="http://schemas.openxmlformats.org/drawingml/2006/main" xmlns:r="http://schemas.openxmlformats.org/officeDocument/2006/relationships" xmlns:p="http://schemas.openxmlformats.org/presentationml/2006/main">
   <p:cSld>
     <p:spTree>
@@ -5577,7 +5880,7 @@
 </p:sld>
 </file>
 
-<file path=ppt/slides/slide15.xml><?xml version="1.0" encoding="utf-8"?>
+<file path=ppt/slides/slide18.xml><?xml version="1.0" encoding="utf-8"?>
 <p:sld xmlns:a="http://schemas.openxmlformats.org/drawingml/2006/main" xmlns:r="http://schemas.openxmlformats.org/officeDocument/2006/relationships" xmlns:p="http://schemas.openxmlformats.org/presentationml/2006/main">
   <p:cSld>
     <p:spTree>
@@ -6091,7 +6394,7 @@
 </p:sld>
 </file>
 
-<file path=ppt/slides/slide16.xml><?xml version="1.0" encoding="utf-8"?>
+<file path=ppt/slides/slide19.xml><?xml version="1.0" encoding="utf-8"?>
 <p:sld xmlns:a="http://schemas.openxmlformats.org/drawingml/2006/main" xmlns:r="http://schemas.openxmlformats.org/officeDocument/2006/relationships" xmlns:p="http://schemas.openxmlformats.org/presentationml/2006/main">
   <p:cSld>
     <p:spTree>
@@ -6348,14 +6651,8 @@
           <a:p>
             <a:pPr lvl="1"/>
             <a:r>
-              <a:rPr lang="en-US" altLang="ko-KR" dirty="0">
-                <a:hlinkClick r:id="rId5"/>
-              </a:rPr>
-              <a:t>http://www.famart.co.kr/resource/ls/%EC%82%AC%EC%9A%A9%EC%84%A4%EB%AA%85%EC%84%9C_XGK_XGB_%EB%AA%85%EB%A0%B9%EC%96%B4%EC%A7%91_%EA%B5%AD%EB%AC%B8_V2.3.pdf</a:t>
-            </a:r>
-            <a:r>
               <a:rPr lang="en-US" altLang="ko-KR" dirty="0"/>
-              <a:t> </a:t>
+              <a:t>http://www.famart.co.kr/resource/ls/%EC%82%AC%EC%9A%A9%EC%84%A4%EB%AA%85%EC%84%9C_XGI_XGR_XEC_%EB%AA%85%EB%A0%B9%EC%96%B4%EC%A7%91_V2.7.pdf</a:t>
             </a:r>
             <a:endParaRPr lang="ko-KR" altLang="en-US" dirty="0"/>
           </a:p>
@@ -6365,6 +6662,224 @@
     <p:extLst>
       <p:ext uri="{BB962C8B-B14F-4D97-AF65-F5344CB8AC3E}">
         <p14:creationId xmlns:p14="http://schemas.microsoft.com/office/powerpoint/2010/main" val="2720908776"/>
+      </p:ext>
+    </p:extLst>
+  </p:cSld>
+  <p:clrMapOvr>
+    <a:masterClrMapping/>
+  </p:clrMapOvr>
+</p:sld>
+</file>
+
+<file path=ppt/slides/slide20.xml><?xml version="1.0" encoding="utf-8"?>
+<p:sld xmlns:a="http://schemas.openxmlformats.org/drawingml/2006/main" xmlns:r="http://schemas.openxmlformats.org/officeDocument/2006/relationships" xmlns:p="http://schemas.openxmlformats.org/presentationml/2006/main">
+  <p:cSld>
+    <p:spTree>
+      <p:nvGrpSpPr>
+        <p:cNvPr id="1" name=""/>
+        <p:cNvGrpSpPr/>
+        <p:nvPr/>
+      </p:nvGrpSpPr>
+      <p:grpSpPr>
+        <a:xfrm>
+          <a:off x="0" y="0"/>
+          <a:ext cx="0" cy="0"/>
+          <a:chOff x="0" y="0"/>
+          <a:chExt cx="0" cy="0"/>
+        </a:xfrm>
+      </p:grpSpPr>
+      <p:sp>
+        <p:nvSpPr>
+          <p:cNvPr id="4" name="제목 3">
+            <a:extLst>
+              <a:ext uri="{FF2B5EF4-FFF2-40B4-BE49-F238E27FC236}">
+                <a16:creationId xmlns:a16="http://schemas.microsoft.com/office/drawing/2014/main" id="{16EFA867-55B0-DBFC-98DB-B382AF802622}"/>
+              </a:ext>
+            </a:extLst>
+          </p:cNvPr>
+          <p:cNvSpPr>
+            <a:spLocks noGrp="1"/>
+          </p:cNvSpPr>
+          <p:nvPr>
+            <p:ph type="ctrTitle"/>
+          </p:nvPr>
+        </p:nvSpPr>
+        <p:spPr/>
+        <p:txBody>
+          <a:bodyPr/>
+          <a:lstStyle/>
+          <a:p>
+            <a:r>
+              <a:rPr lang="ko-KR" altLang="en-US" dirty="0"/>
+              <a:t>작화 특성</a:t>
+            </a:r>
+          </a:p>
+        </p:txBody>
+      </p:sp>
+      <p:sp>
+        <p:nvSpPr>
+          <p:cNvPr id="5" name="부제목 4">
+            <a:extLst>
+              <a:ext uri="{FF2B5EF4-FFF2-40B4-BE49-F238E27FC236}">
+                <a16:creationId xmlns:a16="http://schemas.microsoft.com/office/drawing/2014/main" id="{FA8BBCDC-8D02-F4D6-0F56-EEE3E53015C6}"/>
+              </a:ext>
+            </a:extLst>
+          </p:cNvPr>
+          <p:cNvSpPr>
+            <a:spLocks noGrp="1"/>
+          </p:cNvSpPr>
+          <p:nvPr>
+            <p:ph type="subTitle" idx="1"/>
+          </p:nvPr>
+        </p:nvSpPr>
+        <p:spPr/>
+        <p:txBody>
+          <a:bodyPr/>
+          <a:lstStyle/>
+          <a:p>
+            <a:endParaRPr lang="ko-KR" altLang="en-US"/>
+          </a:p>
+        </p:txBody>
+      </p:sp>
+    </p:spTree>
+    <p:extLst>
+      <p:ext uri="{BB962C8B-B14F-4D97-AF65-F5344CB8AC3E}">
+        <p14:creationId xmlns:p14="http://schemas.microsoft.com/office/powerpoint/2010/main" val="720653391"/>
+      </p:ext>
+    </p:extLst>
+  </p:cSld>
+  <p:clrMapOvr>
+    <a:masterClrMapping/>
+  </p:clrMapOvr>
+</p:sld>
+</file>
+
+<file path=ppt/slides/slide21.xml><?xml version="1.0" encoding="utf-8"?>
+<p:sld xmlns:a="http://schemas.openxmlformats.org/drawingml/2006/main" xmlns:r="http://schemas.openxmlformats.org/officeDocument/2006/relationships" xmlns:p="http://schemas.openxmlformats.org/presentationml/2006/main">
+  <p:cSld>
+    <p:spTree>
+      <p:nvGrpSpPr>
+        <p:cNvPr id="1" name=""/>
+        <p:cNvGrpSpPr/>
+        <p:nvPr/>
+      </p:nvGrpSpPr>
+      <p:grpSpPr>
+        <a:xfrm>
+          <a:off x="0" y="0"/>
+          <a:ext cx="0" cy="0"/>
+          <a:chOff x="0" y="0"/>
+          <a:chExt cx="0" cy="0"/>
+        </a:xfrm>
+      </p:grpSpPr>
+      <p:sp>
+        <p:nvSpPr>
+          <p:cNvPr id="2" name="제목 1">
+            <a:extLst>
+              <a:ext uri="{FF2B5EF4-FFF2-40B4-BE49-F238E27FC236}">
+                <a16:creationId xmlns:a16="http://schemas.microsoft.com/office/drawing/2014/main" id="{E51AE384-C5FA-1804-37B2-A4BB49FE9C63}"/>
+              </a:ext>
+            </a:extLst>
+          </p:cNvPr>
+          <p:cNvSpPr>
+            <a:spLocks noGrp="1"/>
+          </p:cNvSpPr>
+          <p:nvPr>
+            <p:ph type="title"/>
+          </p:nvPr>
+        </p:nvSpPr>
+        <p:spPr/>
+        <p:txBody>
+          <a:bodyPr/>
+          <a:lstStyle/>
+          <a:p>
+            <a:r>
+              <a:rPr lang="en-US" altLang="ko-KR" dirty="0"/>
+              <a:t>Input</a:t>
+            </a:r>
+            <a:r>
+              <a:rPr lang="ko-KR" altLang="en-US" dirty="0"/>
+              <a:t> </a:t>
+            </a:r>
+            <a:r>
+              <a:rPr lang="en-US" altLang="ko-KR" dirty="0"/>
+              <a:t>side</a:t>
+            </a:r>
+            <a:r>
+              <a:rPr lang="ko-KR" altLang="en-US" dirty="0"/>
+              <a:t> </a:t>
+            </a:r>
+            <a:r>
+              <a:rPr lang="ko-KR" altLang="en-US" dirty="0" err="1"/>
+              <a:t>다릿발</a:t>
+            </a:r>
+            <a:endParaRPr lang="ko-KR" altLang="en-US" dirty="0"/>
+          </a:p>
+        </p:txBody>
+      </p:sp>
+      <p:pic>
+        <p:nvPicPr>
+          <p:cNvPr id="5" name="그림 4">
+            <a:extLst>
+              <a:ext uri="{FF2B5EF4-FFF2-40B4-BE49-F238E27FC236}">
+                <a16:creationId xmlns:a16="http://schemas.microsoft.com/office/drawing/2014/main" id="{B4B38613-F556-BB1D-0024-D0915F8F29D2}"/>
+              </a:ext>
+            </a:extLst>
+          </p:cNvPr>
+          <p:cNvPicPr>
+            <a:picLocks noChangeAspect="1"/>
+          </p:cNvPicPr>
+          <p:nvPr/>
+        </p:nvPicPr>
+        <p:blipFill>
+          <a:blip r:embed="rId2"/>
+          <a:stretch>
+            <a:fillRect/>
+          </a:stretch>
+        </p:blipFill>
+        <p:spPr>
+          <a:xfrm>
+            <a:off x="421129" y="1485415"/>
+            <a:ext cx="4685425" cy="4099014"/>
+          </a:xfrm>
+          <a:prstGeom prst="rect">
+            <a:avLst/>
+          </a:prstGeom>
+        </p:spPr>
+      </p:pic>
+      <p:pic>
+        <p:nvPicPr>
+          <p:cNvPr id="9" name="그림 8">
+            <a:extLst>
+              <a:ext uri="{FF2B5EF4-FFF2-40B4-BE49-F238E27FC236}">
+                <a16:creationId xmlns:a16="http://schemas.microsoft.com/office/drawing/2014/main" id="{231C9CA6-EAAC-459A-2A13-691FEC12F1CC}"/>
+              </a:ext>
+            </a:extLst>
+          </p:cNvPr>
+          <p:cNvPicPr>
+            <a:picLocks noChangeAspect="1"/>
+          </p:cNvPicPr>
+          <p:nvPr/>
+        </p:nvPicPr>
+        <p:blipFill>
+          <a:blip r:embed="rId3"/>
+          <a:stretch>
+            <a:fillRect/>
+          </a:stretch>
+        </p:blipFill>
+        <p:spPr>
+          <a:xfrm>
+            <a:off x="4618653" y="3483495"/>
+            <a:ext cx="7395591" cy="2858800"/>
+          </a:xfrm>
+          <a:prstGeom prst="rect">
+            <a:avLst/>
+          </a:prstGeom>
+        </p:spPr>
+      </p:pic>
+    </p:spTree>
+    <p:extLst>
+      <p:ext uri="{BB962C8B-B14F-4D97-AF65-F5344CB8AC3E}">
+        <p14:creationId xmlns:p14="http://schemas.microsoft.com/office/powerpoint/2010/main" val="2898261055"/>
       </p:ext>
     </p:extLst>
   </p:cSld>

</xml_diff>